<commit_message>
Improved intro text/figure (#206)
</commit_message>
<xml_diff>
--- a/charters/wot-wg-2016-figure.pptx
+++ b/charters/wot-wg-2016-figure.pptx
@@ -289,7 +289,7 @@
             <a:fld id="{3C9ACAF3-8F69-4025-A513-300F5CE6E171}" type="datetimeFigureOut">
               <a:rPr lang="de-DE" smtClean="0"/>
               <a:pPr/>
-              <a:t>20.05.2016</a:t>
+              <a:t>25.07.2016</a:t>
             </a:fld>
             <a:endParaRPr lang="de-DE"/>
           </a:p>
@@ -456,7 +456,7 @@
             <a:fld id="{3C9ACAF3-8F69-4025-A513-300F5CE6E171}" type="datetimeFigureOut">
               <a:rPr lang="de-DE" smtClean="0"/>
               <a:pPr/>
-              <a:t>20.05.2016</a:t>
+              <a:t>25.07.2016</a:t>
             </a:fld>
             <a:endParaRPr lang="de-DE"/>
           </a:p>
@@ -633,7 +633,7 @@
             <a:fld id="{3C9ACAF3-8F69-4025-A513-300F5CE6E171}" type="datetimeFigureOut">
               <a:rPr lang="de-DE" smtClean="0"/>
               <a:pPr/>
-              <a:t>20.05.2016</a:t>
+              <a:t>25.07.2016</a:t>
             </a:fld>
             <a:endParaRPr lang="de-DE"/>
           </a:p>
@@ -800,7 +800,7 @@
             <a:fld id="{3C9ACAF3-8F69-4025-A513-300F5CE6E171}" type="datetimeFigureOut">
               <a:rPr lang="de-DE" smtClean="0"/>
               <a:pPr/>
-              <a:t>20.05.2016</a:t>
+              <a:t>25.07.2016</a:t>
             </a:fld>
             <a:endParaRPr lang="de-DE"/>
           </a:p>
@@ -1043,7 +1043,7 @@
             <a:fld id="{3C9ACAF3-8F69-4025-A513-300F5CE6E171}" type="datetimeFigureOut">
               <a:rPr lang="de-DE" smtClean="0"/>
               <a:pPr/>
-              <a:t>20.05.2016</a:t>
+              <a:t>25.07.2016</a:t>
             </a:fld>
             <a:endParaRPr lang="de-DE"/>
           </a:p>
@@ -1328,7 +1328,7 @@
             <a:fld id="{3C9ACAF3-8F69-4025-A513-300F5CE6E171}" type="datetimeFigureOut">
               <a:rPr lang="de-DE" smtClean="0"/>
               <a:pPr/>
-              <a:t>20.05.2016</a:t>
+              <a:t>25.07.2016</a:t>
             </a:fld>
             <a:endParaRPr lang="de-DE"/>
           </a:p>
@@ -1747,7 +1747,7 @@
             <a:fld id="{3C9ACAF3-8F69-4025-A513-300F5CE6E171}" type="datetimeFigureOut">
               <a:rPr lang="de-DE" smtClean="0"/>
               <a:pPr/>
-              <a:t>20.05.2016</a:t>
+              <a:t>25.07.2016</a:t>
             </a:fld>
             <a:endParaRPr lang="de-DE"/>
           </a:p>
@@ -1862,7 +1862,7 @@
             <a:fld id="{3C9ACAF3-8F69-4025-A513-300F5CE6E171}" type="datetimeFigureOut">
               <a:rPr lang="de-DE" smtClean="0"/>
               <a:pPr/>
-              <a:t>20.05.2016</a:t>
+              <a:t>25.07.2016</a:t>
             </a:fld>
             <a:endParaRPr lang="de-DE"/>
           </a:p>
@@ -1954,7 +1954,7 @@
             <a:fld id="{3C9ACAF3-8F69-4025-A513-300F5CE6E171}" type="datetimeFigureOut">
               <a:rPr lang="de-DE" smtClean="0"/>
               <a:pPr/>
-              <a:t>20.05.2016</a:t>
+              <a:t>25.07.2016</a:t>
             </a:fld>
             <a:endParaRPr lang="de-DE"/>
           </a:p>
@@ -2228,7 +2228,7 @@
             <a:fld id="{3C9ACAF3-8F69-4025-A513-300F5CE6E171}" type="datetimeFigureOut">
               <a:rPr lang="de-DE" smtClean="0"/>
               <a:pPr/>
-              <a:t>20.05.2016</a:t>
+              <a:t>25.07.2016</a:t>
             </a:fld>
             <a:endParaRPr lang="de-DE"/>
           </a:p>
@@ -2478,7 +2478,7 @@
             <a:fld id="{3C9ACAF3-8F69-4025-A513-300F5CE6E171}" type="datetimeFigureOut">
               <a:rPr lang="de-DE" smtClean="0"/>
               <a:pPr/>
-              <a:t>20.05.2016</a:t>
+              <a:t>25.07.2016</a:t>
             </a:fld>
             <a:endParaRPr lang="de-DE"/>
           </a:p>
@@ -2688,7 +2688,7 @@
             <a:fld id="{3C9ACAF3-8F69-4025-A513-300F5CE6E171}" type="datetimeFigureOut">
               <a:rPr lang="de-DE" smtClean="0"/>
               <a:pPr/>
-              <a:t>20.05.2016</a:t>
+              <a:t>25.07.2016</a:t>
             </a:fld>
             <a:endParaRPr lang="de-DE"/>
           </a:p>
@@ -3059,669 +3059,30 @@
           <a:chExt cx="0" cy="0"/>
         </a:xfrm>
       </p:grpSpPr>
-      <p:pic>
-        <p:nvPicPr>
-          <p:cNvPr id="1027" name="Picture 3" descr="D:\Projects\W3C\wot\charters\firewall.png"/>
-          <p:cNvPicPr>
-            <a:picLocks noChangeAspect="1" noChangeArrowheads="1"/>
-          </p:cNvPicPr>
-          <p:nvPr/>
-        </p:nvPicPr>
-        <p:blipFill>
-          <a:blip r:embed="rId2" cstate="print"/>
-          <a:srcRect/>
-          <a:stretch>
-            <a:fillRect/>
-          </a:stretch>
-        </p:blipFill>
-        <p:spPr bwMode="auto">
-          <a:xfrm>
-            <a:off x="4634483" y="1821430"/>
-            <a:ext cx="936104" cy="811290"/>
-          </a:xfrm>
-          <a:prstGeom prst="rect">
-            <a:avLst/>
-          </a:prstGeom>
-          <a:noFill/>
-        </p:spPr>
-      </p:pic>
-      <p:pic>
-        <p:nvPicPr>
-          <p:cNvPr id="60" name="図 77"/>
-          <p:cNvPicPr>
-            <a:picLocks noChangeAspect="1"/>
-          </p:cNvPicPr>
-          <p:nvPr/>
-        </p:nvPicPr>
-        <p:blipFill>
-          <a:blip r:embed="rId3" cstate="print">
-            <a:extLst>
-              <a:ext uri="{28A0092B-C50C-407E-A947-70E740481C1C}">
-                <a14:useLocalDpi xmlns:a14="http://schemas.microsoft.com/office/drawing/2010/main" xmlns="" val="0"/>
-              </a:ext>
-            </a:extLst>
-          </a:blip>
-          <a:stretch>
-            <a:fillRect/>
-          </a:stretch>
-        </p:blipFill>
-        <p:spPr>
-          <a:xfrm>
-            <a:off x="1278682" y="4400283"/>
-            <a:ext cx="650213" cy="540885"/>
-          </a:xfrm>
-          <a:prstGeom prst="rect">
-            <a:avLst/>
-          </a:prstGeom>
-        </p:spPr>
-      </p:pic>
-      <p:sp>
-        <p:nvSpPr>
-          <p:cNvPr id="11" name="雲 41"/>
-          <p:cNvSpPr/>
-          <p:nvPr/>
-        </p:nvSpPr>
-        <p:spPr bwMode="gray">
-          <a:xfrm>
-            <a:off x="1043608" y="1052736"/>
-            <a:ext cx="3656521" cy="2448272"/>
-          </a:xfrm>
-          <a:prstGeom prst="cloud">
-            <a:avLst/>
-          </a:prstGeom>
-          <a:solidFill>
-            <a:srgbClr val="DAD9D6"/>
-          </a:solidFill>
-          <a:ln w="9525" cap="flat" cmpd="sng" algn="ctr">
-            <a:solidFill>
-              <a:srgbClr val="B1B1AC"/>
-            </a:solidFill>
-            <a:prstDash val="solid"/>
-            <a:round/>
-            <a:headEnd type="none" w="med" len="med"/>
-            <a:tailEnd type="none" w="med" len="med"/>
-          </a:ln>
-          <a:effectLst/>
-          <a:extLst>
-            <a:ext uri="{AF507438-7753-43E0-B8FC-AC1667EBCBE1}">
-              <a14:hiddenEffects xmlns:a14="http://schemas.microsoft.com/office/drawing/2010/main" xmlns="">
-                <a:effectLst>
-                  <a:outerShdw dist="53882" dir="2700000" algn="ctr" rotWithShape="0">
-                    <a:schemeClr val="bg2">
-                      <a:alpha val="50000"/>
-                    </a:schemeClr>
-                  </a:outerShdw>
-                </a:effectLst>
-              </a14:hiddenEffects>
-            </a:ext>
-          </a:extLst>
-        </p:spPr>
-        <p:txBody>
-          <a:bodyPr rot="0" spcFirstLastPara="0" vertOverflow="overflow" horzOverflow="overflow" vert="horz" wrap="none" lIns="91440" tIns="45720" rIns="91440" bIns="45720" numCol="1" spcCol="0" rtlCol="0" fromWordArt="0" anchor="b" anchorCtr="0" forceAA="0" compatLnSpc="1">
-            <a:prstTxWarp prst="textNoShape">
-              <a:avLst/>
-            </a:prstTxWarp>
-            <a:noAutofit/>
-          </a:bodyPr>
-          <a:lstStyle/>
-          <a:p>
-            <a:pPr algn="ctr" fontAlgn="ctr"/>
-            <a:endParaRPr lang="ja-JP" altLang="en-US" sz="1800" dirty="0" err="1" smtClean="0">
-              <a:solidFill>
-                <a:prstClr val="black"/>
-              </a:solidFill>
-              <a:latin typeface="Gill Sans MT"/>
-              <a:ea typeface="ＭＳ Ｐゴシック" panose="020B0600070205080204" pitchFamily="50" charset="-128"/>
-            </a:endParaRPr>
-          </a:p>
-        </p:txBody>
-      </p:sp>
       <p:grpSp>
         <p:nvGrpSpPr>
-          <p:cNvPr id="72" name="Gruppieren 71"/>
+          <p:cNvPr id="99" name="Gruppieren 98"/>
           <p:cNvGrpSpPr/>
           <p:nvPr/>
         </p:nvGrpSpPr>
         <p:grpSpPr>
           <a:xfrm>
-            <a:off x="1907705" y="4324220"/>
-            <a:ext cx="1061260" cy="1080120"/>
-            <a:chOff x="518985" y="3732127"/>
-            <a:chExt cx="1009825" cy="1562178"/>
+            <a:off x="1834530" y="4327401"/>
+            <a:ext cx="1190046" cy="1033483"/>
+            <a:chOff x="2828012" y="3702859"/>
+            <a:chExt cx="1838118" cy="1596294"/>
           </a:xfrm>
         </p:grpSpPr>
         <p:sp>
           <p:nvSpPr>
-            <p:cNvPr id="73" name="角丸四角形 6"/>
-            <p:cNvSpPr/>
-            <p:nvPr/>
-          </p:nvSpPr>
-          <p:spPr bwMode="auto">
-            <a:xfrm>
-              <a:off x="518985" y="3732127"/>
-              <a:ext cx="1009825" cy="1562178"/>
-            </a:xfrm>
-            <a:prstGeom prst="roundRect">
-              <a:avLst>
-                <a:gd name="adj" fmla="val 6113"/>
-              </a:avLst>
-            </a:prstGeom>
-            <a:gradFill rotWithShape="1">
-              <a:gsLst>
-                <a:gs pos="0">
-                  <a:sysClr val="windowText" lastClr="000000">
-                    <a:tint val="45000"/>
-                    <a:satMod val="200000"/>
-                  </a:sysClr>
-                </a:gs>
-                <a:gs pos="30000">
-                  <a:sysClr val="windowText" lastClr="000000">
-                    <a:tint val="61000"/>
-                    <a:satMod val="200000"/>
-                  </a:sysClr>
-                </a:gs>
-                <a:gs pos="45000">
-                  <a:sysClr val="windowText" lastClr="000000">
-                    <a:tint val="66000"/>
-                    <a:satMod val="200000"/>
-                  </a:sysClr>
-                </a:gs>
-                <a:gs pos="55000">
-                  <a:sysClr val="windowText" lastClr="000000">
-                    <a:tint val="66000"/>
-                    <a:satMod val="200000"/>
-                  </a:sysClr>
-                </a:gs>
-                <a:gs pos="73000">
-                  <a:sysClr val="windowText" lastClr="000000">
-                    <a:tint val="61000"/>
-                    <a:satMod val="200000"/>
-                  </a:sysClr>
-                </a:gs>
-                <a:gs pos="100000">
-                  <a:sysClr val="windowText" lastClr="000000">
-                    <a:tint val="45000"/>
-                    <a:satMod val="200000"/>
-                  </a:sysClr>
-                </a:gs>
-              </a:gsLst>
-              <a:lin ang="950000" scaled="1"/>
-            </a:gradFill>
-            <a:ln w="9525" cap="flat" cmpd="sng" algn="ctr">
-              <a:solidFill>
-                <a:sysClr val="windowText" lastClr="000000"/>
-              </a:solidFill>
-              <a:prstDash val="solid"/>
-              <a:headEnd type="none" w="med" len="med"/>
-              <a:tailEnd type="none" w="med" len="med"/>
-            </a:ln>
-            <a:effectLst>
-              <a:outerShdw blurRad="38100" dist="25400" dir="5400000" rotWithShape="0">
-                <a:srgbClr val="000000">
-                  <a:alpha val="40000"/>
-                </a:srgbClr>
-              </a:outerShdw>
-            </a:effectLst>
-            <a:extLst/>
-          </p:spPr>
-          <p:txBody>
-            <a:bodyPr vert="horz" wrap="none" lIns="91440" tIns="36000" rIns="91440" bIns="45720" numCol="1" rtlCol="0" anchor="t" anchorCtr="0" compatLnSpc="1">
-              <a:prstTxWarp prst="textNoShape">
-                <a:avLst/>
-              </a:prstTxWarp>
-            </a:bodyPr>
-            <a:lstStyle/>
-            <a:p>
-              <a:pPr marL="0" marR="0" lvl="0" indent="0" algn="ctr" defTabSz="914400" eaLnBrk="1" fontAlgn="ctr" latinLnBrk="0" hangingPunct="1">
-                <a:lnSpc>
-                  <a:spcPct val="100000"/>
-                </a:lnSpc>
-                <a:spcBef>
-                  <a:spcPts val="0"/>
-                </a:spcBef>
-                <a:spcAft>
-                  <a:spcPts val="0"/>
-                </a:spcAft>
-                <a:buClrTx/>
-                <a:buSzTx/>
-                <a:buFontTx/>
-                <a:buNone/>
-                <a:tabLst/>
-                <a:defRPr/>
-              </a:pPr>
-              <a:r>
-                <a:rPr kumimoji="0" lang="en-US" altLang="ja-JP" sz="1000" b="0" i="0" u="none" strike="noStrike" kern="0" cap="none" spc="0" normalizeH="0" baseline="0" noProof="0" dirty="0" smtClean="0">
-                  <a:ln>
-                    <a:noFill/>
-                  </a:ln>
-                  <a:solidFill>
-                    <a:srgbClr val="000000"/>
-                  </a:solidFill>
-                  <a:effectLst/>
-                  <a:uLnTx/>
-                  <a:uFillTx/>
-                  <a:latin typeface="Arial" pitchFamily="34" charset="0"/>
-                  <a:ea typeface="HG明朝E" panose="02020909000000000000" pitchFamily="17" charset="-128"/>
-                  <a:cs typeface="Arial" pitchFamily="34" charset="0"/>
-                </a:rPr>
-                <a:t> </a:t>
-              </a:r>
-              <a:r>
-                <a:rPr kumimoji="0" lang="en-US" altLang="ja-JP" sz="1000" b="0" i="0" u="none" strike="noStrike" kern="0" cap="none" spc="0" normalizeH="0" baseline="0" noProof="0" dirty="0" smtClean="0">
-                  <a:ln>
-                    <a:noFill/>
-                  </a:ln>
-                  <a:solidFill>
-                    <a:srgbClr val="000000"/>
-                  </a:solidFill>
-                  <a:effectLst/>
-                  <a:uLnTx/>
-                  <a:uFillTx/>
-                  <a:latin typeface="Arial" pitchFamily="34" charset="0"/>
-                  <a:ea typeface="HG明朝E" panose="02020909000000000000" pitchFamily="17" charset="-128"/>
-                  <a:cs typeface="Arial" pitchFamily="34" charset="0"/>
-                </a:rPr>
-                <a:t>Web Browser</a:t>
-              </a:r>
-              <a:endParaRPr kumimoji="0" lang="ja-JP" altLang="en-US" sz="1000" b="0" i="0" u="none" strike="noStrike" kern="0" cap="none" spc="0" normalizeH="0" baseline="0" noProof="0" dirty="0" smtClean="0">
-                <a:ln>
-                  <a:noFill/>
-                </a:ln>
-                <a:solidFill>
-                  <a:srgbClr val="000000"/>
-                </a:solidFill>
-                <a:effectLst/>
-                <a:uLnTx/>
-                <a:uFillTx/>
-                <a:latin typeface="Arial" pitchFamily="34" charset="0"/>
-                <a:ea typeface="HG明朝E" panose="02020909000000000000" pitchFamily="17" charset="-128"/>
-                <a:cs typeface="Arial" pitchFamily="34" charset="0"/>
-              </a:endParaRPr>
-            </a:p>
-          </p:txBody>
-        </p:sp>
-        <p:sp>
-          <p:nvSpPr>
-            <p:cNvPr id="75" name="角丸四角形 24"/>
-            <p:cNvSpPr/>
-            <p:nvPr/>
-          </p:nvSpPr>
-          <p:spPr bwMode="auto">
-            <a:xfrm>
-              <a:off x="595428" y="4955588"/>
-              <a:ext cx="856939" cy="246333"/>
-            </a:xfrm>
-            <a:prstGeom prst="roundRect">
-              <a:avLst/>
-            </a:prstGeom>
-            <a:solidFill>
-              <a:srgbClr val="92D050"/>
-            </a:solidFill>
-            <a:ln w="25400" cap="flat" cmpd="sng" algn="ctr">
-              <a:solidFill>
-                <a:srgbClr val="1BA12B"/>
-              </a:solidFill>
-              <a:prstDash val="solid"/>
-              <a:round/>
-              <a:headEnd type="none" w="med" len="med"/>
-              <a:tailEnd type="none" w="med" len="med"/>
-            </a:ln>
-            <a:effectLst/>
-            <a:extLst/>
-          </p:spPr>
-          <p:txBody>
-            <a:bodyPr vert="horz" wrap="square" lIns="36000" tIns="45720" rIns="36000" bIns="45720" numCol="1" rtlCol="0" anchor="ctr" anchorCtr="0" compatLnSpc="1">
-              <a:prstTxWarp prst="textNoShape">
-                <a:avLst/>
-              </a:prstTxWarp>
-            </a:bodyPr>
-            <a:lstStyle/>
-            <a:p>
-              <a:pPr algn="ctr" fontAlgn="ctr"/>
-              <a:r>
-                <a:rPr lang="en-US" altLang="ja-JP" sz="600" dirty="0" smtClean="0">
-                  <a:solidFill>
-                    <a:prstClr val="black"/>
-                  </a:solidFill>
-                  <a:latin typeface="Arial" pitchFamily="34" charset="0"/>
-                  <a:ea typeface="HG明朝E" panose="02020909000000000000" pitchFamily="17" charset="-128"/>
-                  <a:cs typeface="Arial" pitchFamily="34" charset="0"/>
-                </a:rPr>
-                <a:t>Protocol Bindings</a:t>
-              </a:r>
-              <a:endParaRPr lang="ja-JP" altLang="en-US" sz="600" dirty="0" smtClean="0">
-                <a:solidFill>
-                  <a:prstClr val="black"/>
-                </a:solidFill>
-                <a:latin typeface="Arial" pitchFamily="34" charset="0"/>
-                <a:ea typeface="HG明朝E" panose="02020909000000000000" pitchFamily="17" charset="-128"/>
-                <a:cs typeface="Arial" pitchFamily="34" charset="0"/>
-              </a:endParaRPr>
-            </a:p>
-          </p:txBody>
-        </p:sp>
-        <p:sp>
-          <p:nvSpPr>
-            <p:cNvPr id="76" name="角丸四角形 21"/>
-            <p:cNvSpPr/>
-            <p:nvPr/>
-          </p:nvSpPr>
-          <p:spPr bwMode="auto">
-            <a:xfrm>
-              <a:off x="595497" y="4695415"/>
-              <a:ext cx="856800" cy="224799"/>
-            </a:xfrm>
-            <a:prstGeom prst="roundRect">
-              <a:avLst/>
-            </a:prstGeom>
-            <a:solidFill>
-              <a:srgbClr val="0070C0"/>
-            </a:solidFill>
-            <a:ln w="25400" cap="flat" cmpd="sng" algn="ctr">
-              <a:solidFill>
-                <a:srgbClr val="0000FF"/>
-              </a:solidFill>
-              <a:prstDash val="solid"/>
-              <a:round/>
-              <a:headEnd type="none" w="med" len="med"/>
-              <a:tailEnd type="none" w="med" len="med"/>
-            </a:ln>
-            <a:effectLst/>
-            <a:extLst/>
-          </p:spPr>
-          <p:txBody>
-            <a:bodyPr vert="horz" wrap="square" lIns="91440" tIns="45720" rIns="91440" bIns="45720" numCol="1" rtlCol="0" anchor="ctr" anchorCtr="0" compatLnSpc="1">
-              <a:prstTxWarp prst="textNoShape">
-                <a:avLst/>
-              </a:prstTxWarp>
-            </a:bodyPr>
-            <a:lstStyle/>
-            <a:p>
-              <a:pPr algn="ctr" fontAlgn="ctr"/>
-              <a:r>
-                <a:rPr lang="en-US" altLang="ja-JP" sz="600" dirty="0" smtClean="0">
-                  <a:solidFill>
-                    <a:schemeClr val="bg1"/>
-                  </a:solidFill>
-                  <a:latin typeface="Arial" pitchFamily="34" charset="0"/>
-                  <a:ea typeface="HG明朝E" panose="02020909000000000000" pitchFamily="17" charset="-128"/>
-                  <a:cs typeface="Arial" pitchFamily="34" charset="0"/>
-                </a:rPr>
-                <a:t>Resource</a:t>
-              </a:r>
-              <a:r>
-                <a:rPr lang="ja-JP" altLang="en-US" sz="600">
-                  <a:solidFill>
-                    <a:schemeClr val="bg1"/>
-                  </a:solidFill>
-                  <a:latin typeface="Arial" pitchFamily="34" charset="0"/>
-                  <a:ea typeface="HG明朝E" panose="02020909000000000000" pitchFamily="17" charset="-128"/>
-                  <a:cs typeface="Arial" pitchFamily="34" charset="0"/>
-                </a:rPr>
-                <a:t> </a:t>
-              </a:r>
-              <a:r>
-                <a:rPr lang="en-US" altLang="ja-JP" sz="600" dirty="0" smtClean="0">
-                  <a:solidFill>
-                    <a:schemeClr val="bg1"/>
-                  </a:solidFill>
-                  <a:latin typeface="Arial" pitchFamily="34" charset="0"/>
-                  <a:ea typeface="HG明朝E" panose="02020909000000000000" pitchFamily="17" charset="-128"/>
-                  <a:cs typeface="Arial" pitchFamily="34" charset="0"/>
-                </a:rPr>
-                <a:t>Model</a:t>
-              </a:r>
-              <a:endParaRPr lang="ja-JP" altLang="en-US" sz="600" dirty="0" smtClean="0">
-                <a:solidFill>
-                  <a:schemeClr val="bg1"/>
-                </a:solidFill>
-                <a:latin typeface="Arial" pitchFamily="34" charset="0"/>
-                <a:ea typeface="HG明朝E" panose="02020909000000000000" pitchFamily="17" charset="-128"/>
-                <a:cs typeface="Arial" pitchFamily="34" charset="0"/>
-              </a:endParaRPr>
-            </a:p>
-          </p:txBody>
-        </p:sp>
-        <p:sp>
-          <p:nvSpPr>
-            <p:cNvPr id="77" name="縦巻き 49"/>
-            <p:cNvSpPr/>
-            <p:nvPr/>
-          </p:nvSpPr>
-          <p:spPr bwMode="auto">
-            <a:xfrm>
-              <a:off x="595497" y="4050828"/>
-              <a:ext cx="856800" cy="229507"/>
-            </a:xfrm>
-            <a:prstGeom prst="verticalScroll">
-              <a:avLst/>
-            </a:prstGeom>
-            <a:solidFill>
-              <a:srgbClr val="7030A0"/>
-            </a:solidFill>
-            <a:ln w="9525" cap="flat" cmpd="sng" algn="ctr">
-              <a:solidFill>
-                <a:schemeClr val="accent4">
-                  <a:lumMod val="50000"/>
-                </a:schemeClr>
-              </a:solidFill>
-              <a:prstDash val="solid"/>
-              <a:round/>
-              <a:headEnd type="none" w="med" len="med"/>
-              <a:tailEnd type="none" w="med" len="med"/>
-            </a:ln>
-            <a:effectLst/>
-            <a:extLst/>
-          </p:spPr>
-          <p:txBody>
-            <a:bodyPr vert="horz" wrap="none" lIns="91440" tIns="45720" rIns="91440" bIns="45720" numCol="1" rtlCol="0" anchor="ctr" anchorCtr="0" compatLnSpc="1">
-              <a:prstTxWarp prst="textNoShape">
-                <a:avLst/>
-              </a:prstTxWarp>
-            </a:bodyPr>
-            <a:lstStyle/>
-            <a:p>
-              <a:pPr marL="0" marR="0" lvl="0" indent="0" algn="ctr" defTabSz="914400" eaLnBrk="1" fontAlgn="ctr" latinLnBrk="0" hangingPunct="1">
-                <a:lnSpc>
-                  <a:spcPct val="100000"/>
-                </a:lnSpc>
-                <a:spcBef>
-                  <a:spcPts val="0"/>
-                </a:spcBef>
-                <a:spcAft>
-                  <a:spcPts val="0"/>
-                </a:spcAft>
-                <a:buClrTx/>
-                <a:buSzTx/>
-                <a:buFontTx/>
-                <a:buNone/>
-                <a:tabLst/>
-                <a:defRPr/>
-              </a:pPr>
-              <a:r>
-                <a:rPr kumimoji="0" lang="en-US" altLang="ja-JP" sz="600" b="0" i="0" u="none" strike="noStrike" kern="0" cap="none" spc="0" normalizeH="0" baseline="0" noProof="0" dirty="0" smtClean="0">
-                  <a:ln>
-                    <a:noFill/>
-                  </a:ln>
-                  <a:solidFill>
-                    <a:prstClr val="white"/>
-                  </a:solidFill>
-                  <a:effectLst/>
-                  <a:uLnTx/>
-                  <a:uFillTx/>
-                  <a:latin typeface="Arial" pitchFamily="34" charset="0"/>
-                  <a:ea typeface="HG明朝E" panose="02020909000000000000" pitchFamily="17" charset="-128"/>
-                  <a:cs typeface="Arial" pitchFamily="34" charset="0"/>
-                </a:rPr>
-                <a:t>App Script</a:t>
-              </a:r>
-              <a:endParaRPr kumimoji="0" lang="ja-JP" altLang="en-US" sz="600" b="0" i="0" u="none" strike="noStrike" kern="0" cap="none" spc="0" normalizeH="0" baseline="0" noProof="0" dirty="0" smtClean="0">
-                <a:ln>
-                  <a:noFill/>
-                </a:ln>
-                <a:solidFill>
-                  <a:prstClr val="white"/>
-                </a:solidFill>
-                <a:effectLst/>
-                <a:uLnTx/>
-                <a:uFillTx/>
-                <a:latin typeface="Arial" pitchFamily="34" charset="0"/>
-                <a:ea typeface="HG明朝E" panose="02020909000000000000" pitchFamily="17" charset="-128"/>
-                <a:cs typeface="Arial" pitchFamily="34" charset="0"/>
-              </a:endParaRPr>
-            </a:p>
-          </p:txBody>
-        </p:sp>
-        <p:sp>
-          <p:nvSpPr>
-            <p:cNvPr id="78" name="角丸四角形 21"/>
-            <p:cNvSpPr/>
-            <p:nvPr/>
-          </p:nvSpPr>
-          <p:spPr bwMode="auto">
-            <a:xfrm>
-              <a:off x="595497" y="4406495"/>
-              <a:ext cx="856800" cy="253546"/>
-            </a:xfrm>
-            <a:prstGeom prst="roundRect">
-              <a:avLst/>
-            </a:prstGeom>
-            <a:solidFill>
-              <a:srgbClr val="7030A0"/>
-            </a:solidFill>
-            <a:ln w="25400" cap="flat" cmpd="sng" algn="ctr">
-              <a:solidFill>
-                <a:schemeClr val="accent4">
-                  <a:lumMod val="50000"/>
-                </a:schemeClr>
-              </a:solidFill>
-              <a:prstDash val="solid"/>
-              <a:round/>
-              <a:headEnd type="none" w="med" len="med"/>
-              <a:tailEnd type="none" w="med" len="med"/>
-            </a:ln>
-            <a:effectLst/>
-            <a:extLst/>
-          </p:spPr>
-          <p:txBody>
-            <a:bodyPr vert="horz" wrap="square" lIns="0" tIns="45720" rIns="0" bIns="45720" numCol="1" rtlCol="0" anchor="ctr" anchorCtr="0" compatLnSpc="1">
-              <a:prstTxWarp prst="textNoShape">
-                <a:avLst/>
-              </a:prstTxWarp>
-            </a:bodyPr>
-            <a:lstStyle/>
-            <a:p>
-              <a:pPr algn="ctr" fontAlgn="ctr"/>
-              <a:r>
-                <a:rPr lang="en-US" altLang="ja-JP" sz="600" dirty="0" smtClean="0">
-                  <a:solidFill>
-                    <a:schemeClr val="bg1"/>
-                  </a:solidFill>
-                  <a:latin typeface="Arial" pitchFamily="34" charset="0"/>
-                  <a:ea typeface="HG明朝E" panose="02020909000000000000" pitchFamily="17" charset="-128"/>
-                  <a:cs typeface="Arial" pitchFamily="34" charset="0"/>
-                </a:rPr>
-                <a:t>Runtime Environment</a:t>
-              </a:r>
-              <a:endParaRPr lang="ja-JP" altLang="en-US" sz="600" dirty="0" smtClean="0">
-                <a:solidFill>
-                  <a:schemeClr val="bg1"/>
-                </a:solidFill>
-                <a:latin typeface="Arial" pitchFamily="34" charset="0"/>
-                <a:ea typeface="HG明朝E" panose="02020909000000000000" pitchFamily="17" charset="-128"/>
-                <a:cs typeface="Arial" pitchFamily="34" charset="0"/>
-              </a:endParaRPr>
-            </a:p>
-          </p:txBody>
-        </p:sp>
-        <p:cxnSp>
-          <p:nvCxnSpPr>
-            <p:cNvPr id="79" name="直線矢印コネクタ 40"/>
-            <p:cNvCxnSpPr/>
-            <p:nvPr/>
-          </p:nvCxnSpPr>
-          <p:spPr bwMode="auto">
-            <a:xfrm>
-              <a:off x="1023897" y="4253745"/>
-              <a:ext cx="0" cy="175070"/>
-            </a:xfrm>
-            <a:prstGeom prst="straightConnector1">
-              <a:avLst/>
-            </a:prstGeom>
-            <a:noFill/>
-            <a:ln w="19050" cap="flat" cmpd="sng" algn="ctr">
-              <a:solidFill>
-                <a:sysClr val="windowText" lastClr="000000"/>
-              </a:solidFill>
-              <a:prstDash val="solid"/>
-              <a:headEnd type="triangle" w="med" len="sm"/>
-              <a:tailEnd type="triangle" w="med" len="sm"/>
-            </a:ln>
-            <a:effectLst>
-              <a:outerShdw blurRad="38100" dist="25400" dir="5400000" rotWithShape="0">
-                <a:srgbClr val="000000">
-                  <a:alpha val="40000"/>
-                </a:srgbClr>
-              </a:outerShdw>
-            </a:effectLst>
-            <a:extLst/>
-          </p:spPr>
-        </p:cxnSp>
-      </p:grpSp>
-      <p:pic>
-        <p:nvPicPr>
-          <p:cNvPr id="40" name="図 78"/>
-          <p:cNvPicPr>
-            <a:picLocks noChangeAspect="1"/>
-          </p:cNvPicPr>
-          <p:nvPr/>
-        </p:nvPicPr>
-        <p:blipFill>
-          <a:blip r:embed="rId4" cstate="print">
-            <a:extLst>
-              <a:ext uri="{28A0092B-C50C-407E-A947-70E740481C1C}">
-                <a14:useLocalDpi xmlns:a14="http://schemas.microsoft.com/office/drawing/2010/main" xmlns="" val="0"/>
-              </a:ext>
-            </a:extLst>
-          </a:blip>
-          <a:stretch>
-            <a:fillRect/>
-          </a:stretch>
-        </p:blipFill>
-        <p:spPr>
-          <a:xfrm>
-            <a:off x="1710730" y="4048388"/>
-            <a:ext cx="413874" cy="603217"/>
-          </a:xfrm>
-          <a:prstGeom prst="rect">
-            <a:avLst/>
-          </a:prstGeom>
-        </p:spPr>
-      </p:pic>
-      <p:grpSp>
-        <p:nvGrpSpPr>
-          <p:cNvPr id="105" name="Gruppieren 104"/>
-          <p:cNvGrpSpPr/>
-          <p:nvPr/>
-        </p:nvGrpSpPr>
-        <p:grpSpPr>
-          <a:xfrm>
-            <a:off x="5660284" y="2365208"/>
-            <a:ext cx="1190046" cy="1025651"/>
-            <a:chOff x="2828012" y="3702859"/>
-            <a:chExt cx="1838118" cy="1584197"/>
-          </a:xfrm>
-        </p:grpSpPr>
-        <p:sp>
-          <p:nvSpPr>
-            <p:cNvPr id="106" name="角丸四角形 6"/>
+            <p:cNvPr id="100" name="角丸四角形 6"/>
             <p:cNvSpPr/>
             <p:nvPr/>
           </p:nvSpPr>
           <p:spPr bwMode="auto">
             <a:xfrm>
               <a:off x="2828012" y="3702859"/>
-              <a:ext cx="1838118" cy="1584197"/>
+              <a:ext cx="1838118" cy="1596294"/>
             </a:xfrm>
             <a:prstGeom prst="roundRect">
               <a:avLst>
@@ -3812,23 +3173,6 @@
                 <a:defRPr/>
               </a:pPr>
               <a:r>
-                <a:rPr kumimoji="0" lang="en-US" altLang="ja-JP" sz="1000" b="0" i="0" u="none" strike="noStrike" kern="0" cap="none" spc="0" normalizeH="0" baseline="0" noProof="0" dirty="0" err="1" smtClean="0">
-                  <a:ln>
-                    <a:noFill/>
-                  </a:ln>
-                  <a:solidFill>
-                    <a:srgbClr val="000000"/>
-                  </a:solidFill>
-                  <a:effectLst/>
-                  <a:uLnTx/>
-                  <a:uFillTx/>
-                  <a:latin typeface="Arial" pitchFamily="34" charset="0"/>
-                  <a:ea typeface="HG明朝E" panose="02020909000000000000" pitchFamily="17" charset="-128"/>
-                  <a:cs typeface="Arial" pitchFamily="34" charset="0"/>
-                </a:rPr>
-                <a:t>WoT</a:t>
-              </a:r>
-              <a:r>
                 <a:rPr kumimoji="0" lang="en-US" altLang="ja-JP" sz="1000" b="0" i="0" u="none" strike="noStrike" kern="0" cap="none" spc="0" normalizeH="0" baseline="0" noProof="0" dirty="0" smtClean="0">
                   <a:ln>
                     <a:noFill/>
@@ -3843,7 +3187,7 @@
                   <a:ea typeface="HG明朝E" panose="02020909000000000000" pitchFamily="17" charset="-128"/>
                   <a:cs typeface="Arial" pitchFamily="34" charset="0"/>
                 </a:rPr>
-                <a:t> Servient</a:t>
+                <a:t>Web Browser</a:t>
               </a:r>
               <a:endParaRPr kumimoji="0" lang="ja-JP" altLang="en-US" sz="1000" b="0" i="0" u="none" strike="noStrike" kern="0" cap="none" spc="0" normalizeH="0" baseline="0" noProof="0" dirty="0" smtClean="0">
                 <a:ln>
@@ -3864,14 +3208,14 @@
         </p:sp>
         <p:sp>
           <p:nvSpPr>
-            <p:cNvPr id="109" name="角丸四角形 24"/>
+            <p:cNvPr id="101" name="角丸四角形 24"/>
             <p:cNvSpPr/>
             <p:nvPr/>
           </p:nvSpPr>
           <p:spPr bwMode="auto">
             <a:xfrm>
-              <a:off x="2912999" y="4942119"/>
-              <a:ext cx="1668143" cy="246334"/>
+              <a:off x="2912999" y="4905848"/>
+              <a:ext cx="1668143" cy="326741"/>
             </a:xfrm>
             <a:prstGeom prst="roundRect">
               <a:avLst/>
@@ -3917,7 +3261,7 @@
                 <a:defRPr/>
               </a:pPr>
               <a:r>
-                <a:rPr kumimoji="0" lang="en-US" altLang="ja-JP" sz="600" b="0" i="0" u="none" strike="noStrike" kern="0" cap="none" spc="0" normalizeH="0" baseline="0" noProof="0" dirty="0" smtClean="0">
+                <a:rPr kumimoji="0" lang="en-US" altLang="ja-JP" sz="800" b="0" i="0" u="none" strike="noStrike" kern="0" cap="none" spc="0" normalizeH="0" baseline="0" noProof="0" dirty="0" smtClean="0">
                   <a:ln>
                     <a:noFill/>
                   </a:ln>
@@ -3931,9 +3275,26 @@
                   <a:ea typeface="HG明朝E" panose="02020909000000000000" pitchFamily="17" charset="-128"/>
                   <a:cs typeface="Arial" pitchFamily="34" charset="0"/>
                 </a:rPr>
-                <a:t>Protocol Bindings</a:t>
+                <a:t>Protocol </a:t>
               </a:r>
-              <a:endParaRPr kumimoji="0" lang="ja-JP" altLang="en-US" sz="600" b="0" i="0" u="none" strike="noStrike" kern="0" cap="none" spc="0" normalizeH="0" baseline="0" noProof="0" dirty="0" smtClean="0">
+              <a:r>
+                <a:rPr kumimoji="0" lang="en-US" altLang="ja-JP" sz="800" b="0" i="0" u="none" strike="noStrike" kern="0" cap="none" spc="0" normalizeH="0" baseline="0" noProof="0" dirty="0" smtClean="0">
+                  <a:ln>
+                    <a:noFill/>
+                  </a:ln>
+                  <a:solidFill>
+                    <a:prstClr val="black"/>
+                  </a:solidFill>
+                  <a:effectLst/>
+                  <a:uLnTx/>
+                  <a:uFillTx/>
+                  <a:latin typeface="Arial" pitchFamily="34" charset="0"/>
+                  <a:ea typeface="HG明朝E" panose="02020909000000000000" pitchFamily="17" charset="-128"/>
+                  <a:cs typeface="Arial" pitchFamily="34" charset="0"/>
+                </a:rPr>
+                <a:t>Bindings</a:t>
+              </a:r>
+              <a:endParaRPr kumimoji="0" lang="ja-JP" altLang="en-US" sz="800" b="0" i="0" u="none" strike="noStrike" kern="0" cap="none" spc="0" normalizeH="0" baseline="0" noProof="0" dirty="0" smtClean="0">
                 <a:ln>
                   <a:noFill/>
                 </a:ln>
@@ -3952,14 +3313,14 @@
         </p:sp>
         <p:sp>
           <p:nvSpPr>
-            <p:cNvPr id="110" name="角丸四角形 21"/>
+            <p:cNvPr id="102" name="角丸四角形 21"/>
             <p:cNvSpPr/>
             <p:nvPr/>
           </p:nvSpPr>
           <p:spPr bwMode="auto">
             <a:xfrm>
-              <a:off x="2912999" y="4688348"/>
-              <a:ext cx="1668143" cy="215195"/>
+              <a:off x="2912999" y="4595156"/>
+              <a:ext cx="1668143" cy="285438"/>
             </a:xfrm>
             <a:prstGeom prst="roundRect">
               <a:avLst/>
@@ -4005,7 +3366,7 @@
                 <a:defRPr/>
               </a:pPr>
               <a:r>
-                <a:rPr kumimoji="0" lang="en-US" altLang="ja-JP" sz="600" b="0" i="0" u="none" strike="noStrike" kern="0" cap="none" spc="0" normalizeH="0" baseline="0" noProof="0" dirty="0" smtClean="0">
+                <a:rPr kumimoji="0" lang="en-US" altLang="ja-JP" sz="800" b="0" i="0" u="none" strike="noStrike" kern="0" cap="none" spc="0" normalizeH="0" baseline="0" noProof="0" dirty="0" smtClean="0">
                   <a:ln>
                     <a:noFill/>
                   </a:ln>
@@ -4022,7 +3383,7 @@
                 <a:t>Resource</a:t>
               </a:r>
               <a:r>
-                <a:rPr kumimoji="0" lang="ja-JP" altLang="en-US" sz="600" b="0" i="0" u="none" strike="noStrike" kern="0" cap="none" spc="0" normalizeH="0" baseline="0" noProof="0" smtClean="0">
+                <a:rPr kumimoji="0" lang="ja-JP" altLang="en-US" sz="800" b="0" i="0" u="none" strike="noStrike" kern="0" cap="none" spc="0" normalizeH="0" baseline="0" noProof="0" smtClean="0">
                   <a:ln>
                     <a:noFill/>
                   </a:ln>
@@ -4039,7 +3400,7 @@
                 <a:t> </a:t>
               </a:r>
               <a:r>
-                <a:rPr kumimoji="0" lang="en-US" altLang="ja-JP" sz="600" b="0" i="0" u="none" strike="noStrike" kern="0" cap="none" spc="0" normalizeH="0" baseline="0" noProof="0" dirty="0" smtClean="0">
+                <a:rPr kumimoji="0" lang="en-US" altLang="ja-JP" sz="800" b="0" i="0" u="none" strike="noStrike" kern="0" cap="none" spc="0" normalizeH="0" baseline="0" noProof="0" dirty="0" smtClean="0">
                   <a:ln>
                     <a:noFill/>
                   </a:ln>
@@ -4055,7 +3416,7 @@
                 </a:rPr>
                 <a:t>Model</a:t>
               </a:r>
-              <a:endParaRPr kumimoji="0" lang="ja-JP" altLang="en-US" sz="600" b="0" i="0" u="none" strike="noStrike" kern="0" cap="none" spc="0" normalizeH="0" baseline="0" noProof="0" dirty="0" smtClean="0">
+              <a:endParaRPr kumimoji="0" lang="ja-JP" altLang="en-US" sz="800" b="0" i="0" u="none" strike="noStrike" kern="0" cap="none" spc="0" normalizeH="0" baseline="0" noProof="0" dirty="0" smtClean="0">
                 <a:ln>
                   <a:noFill/>
                 </a:ln>
@@ -4074,14 +3435,14 @@
         </p:sp>
         <p:sp>
           <p:nvSpPr>
-            <p:cNvPr id="111" name="縦巻き 49"/>
+            <p:cNvPr id="103" name="縦巻き 49"/>
             <p:cNvSpPr/>
             <p:nvPr/>
           </p:nvSpPr>
           <p:spPr bwMode="auto">
             <a:xfrm>
-              <a:off x="2912999" y="4059961"/>
-              <a:ext cx="1668143" cy="210107"/>
+              <a:off x="2912999" y="4054908"/>
+              <a:ext cx="1668143" cy="500211"/>
             </a:xfrm>
             <a:prstGeom prst="verticalScroll">
               <a:avLst/>
@@ -4111,6 +3472,149 @@
             </a:bodyPr>
             <a:lstStyle/>
             <a:p>
+              <a:pPr lvl="0" algn="ctr" fontAlgn="ctr">
+                <a:defRPr/>
+              </a:pPr>
+              <a:r>
+                <a:rPr lang="en-US" altLang="ja-JP" sz="800" kern="0" dirty="0" smtClean="0">
+                  <a:solidFill>
+                    <a:prstClr val="white"/>
+                  </a:solidFill>
+                  <a:latin typeface="Arial" pitchFamily="34" charset="0"/>
+                  <a:ea typeface="HG明朝E" panose="02020909000000000000" pitchFamily="17" charset="-128"/>
+                  <a:cs typeface="Arial" pitchFamily="34" charset="0"/>
+                </a:rPr>
+                <a:t>App Script with</a:t>
+              </a:r>
+              <a:br>
+                <a:rPr lang="en-US" altLang="ja-JP" sz="800" kern="0" dirty="0" smtClean="0">
+                  <a:solidFill>
+                    <a:prstClr val="white"/>
+                  </a:solidFill>
+                  <a:latin typeface="Arial" pitchFamily="34" charset="0"/>
+                  <a:ea typeface="HG明朝E" panose="02020909000000000000" pitchFamily="17" charset="-128"/>
+                  <a:cs typeface="Arial" pitchFamily="34" charset="0"/>
+                </a:rPr>
+              </a:br>
+              <a:r>
+                <a:rPr lang="en-US" altLang="ja-JP" sz="800" kern="0" dirty="0" smtClean="0">
+                  <a:solidFill>
+                    <a:prstClr val="white"/>
+                  </a:solidFill>
+                  <a:latin typeface="Arial" pitchFamily="34" charset="0"/>
+                  <a:ea typeface="HG明朝E" panose="02020909000000000000" pitchFamily="17" charset="-128"/>
+                  <a:cs typeface="Arial" pitchFamily="34" charset="0"/>
+                </a:rPr>
+                <a:t>Software Objects</a:t>
+              </a:r>
+              <a:endParaRPr lang="ja-JP" altLang="en-US" sz="800" kern="0" dirty="0" smtClean="0">
+                <a:solidFill>
+                  <a:prstClr val="white"/>
+                </a:solidFill>
+                <a:latin typeface="Arial" pitchFamily="34" charset="0"/>
+                <a:ea typeface="HG明朝E" panose="02020909000000000000" pitchFamily="17" charset="-128"/>
+                <a:cs typeface="Arial" pitchFamily="34" charset="0"/>
+              </a:endParaRPr>
+            </a:p>
+          </p:txBody>
+        </p:sp>
+      </p:grpSp>
+      <p:grpSp>
+        <p:nvGrpSpPr>
+          <p:cNvPr id="94" name="Gruppieren 93"/>
+          <p:cNvGrpSpPr/>
+          <p:nvPr/>
+        </p:nvGrpSpPr>
+        <p:grpSpPr>
+          <a:xfrm>
+            <a:off x="6478116" y="4384154"/>
+            <a:ext cx="1190046" cy="1033483"/>
+            <a:chOff x="2828012" y="3702859"/>
+            <a:chExt cx="1838118" cy="1596294"/>
+          </a:xfrm>
+        </p:grpSpPr>
+        <p:sp>
+          <p:nvSpPr>
+            <p:cNvPr id="95" name="角丸四角形 6"/>
+            <p:cNvSpPr/>
+            <p:nvPr/>
+          </p:nvSpPr>
+          <p:spPr bwMode="auto">
+            <a:xfrm>
+              <a:off x="2828012" y="3702859"/>
+              <a:ext cx="1838118" cy="1596294"/>
+            </a:xfrm>
+            <a:prstGeom prst="roundRect">
+              <a:avLst>
+                <a:gd name="adj" fmla="val 6113"/>
+              </a:avLst>
+            </a:prstGeom>
+            <a:gradFill rotWithShape="1">
+              <a:gsLst>
+                <a:gs pos="0">
+                  <a:sysClr val="windowText" lastClr="000000">
+                    <a:tint val="45000"/>
+                    <a:satMod val="200000"/>
+                  </a:sysClr>
+                </a:gs>
+                <a:gs pos="30000">
+                  <a:sysClr val="windowText" lastClr="000000">
+                    <a:tint val="61000"/>
+                    <a:satMod val="200000"/>
+                  </a:sysClr>
+                </a:gs>
+                <a:gs pos="45000">
+                  <a:sysClr val="windowText" lastClr="000000">
+                    <a:tint val="66000"/>
+                    <a:satMod val="200000"/>
+                  </a:sysClr>
+                </a:gs>
+                <a:gs pos="55000">
+                  <a:sysClr val="windowText" lastClr="000000">
+                    <a:tint val="66000"/>
+                    <a:satMod val="200000"/>
+                  </a:sysClr>
+                </a:gs>
+                <a:gs pos="73000">
+                  <a:sysClr val="windowText" lastClr="000000">
+                    <a:tint val="61000"/>
+                    <a:satMod val="200000"/>
+                  </a:sysClr>
+                </a:gs>
+                <a:gs pos="100000">
+                  <a:sysClr val="windowText" lastClr="000000">
+                    <a:tint val="45000"/>
+                    <a:satMod val="200000"/>
+                  </a:sysClr>
+                </a:gs>
+              </a:gsLst>
+              <a:lin ang="950000" scaled="1"/>
+            </a:gradFill>
+            <a:ln w="9525" cap="flat" cmpd="sng" algn="ctr">
+              <a:solidFill>
+                <a:sysClr val="windowText" lastClr="000000"/>
+              </a:solidFill>
+              <a:prstDash val="solid"/>
+              <a:headEnd type="none" w="med" len="med"/>
+              <a:tailEnd type="none" w="med" len="med"/>
+            </a:ln>
+            <a:effectLst>
+              <a:outerShdw blurRad="38100" dist="25400" dir="5400000" rotWithShape="0">
+                <a:srgbClr val="000000">
+                  <a:alpha val="40000"/>
+                </a:srgbClr>
+              </a:outerShdw>
+            </a:effectLst>
+            <a:extLst/>
+          </p:spPr>
+          <p:txBody>
+            <a:bodyPr vert="horz" wrap="none" lIns="91440" tIns="36000" rIns="91440" bIns="36000" numCol="1" rtlCol="0" anchor="t" anchorCtr="0" compatLnSpc="1">
+              <a:prstTxWarp prst="textNoShape">
+                <a:avLst/>
+              </a:prstTxWarp>
+            </a:bodyPr>
+            <a:lstStyle/>
+            <a:p>
               <a:pPr marL="0" marR="0" lvl="0" indent="0" algn="ctr" defTabSz="914400" eaLnBrk="1" fontAlgn="ctr" latinLnBrk="0" hangingPunct="1">
                 <a:lnSpc>
                   <a:spcPct val="100000"/>
@@ -4129,12 +3633,12 @@
                 <a:defRPr/>
               </a:pPr>
               <a:r>
-                <a:rPr kumimoji="0" lang="en-US" altLang="ja-JP" sz="600" b="0" i="0" u="none" strike="noStrike" kern="0" cap="none" spc="0" normalizeH="0" baseline="0" noProof="0" dirty="0" smtClean="0">
+                <a:rPr kumimoji="0" lang="en-US" altLang="ja-JP" sz="1000" b="0" i="0" u="none" strike="noStrike" kern="0" cap="none" spc="0" normalizeH="0" baseline="0" noProof="0" dirty="0" smtClean="0">
                   <a:ln>
                     <a:noFill/>
                   </a:ln>
                   <a:solidFill>
-                    <a:prstClr val="white"/>
+                    <a:srgbClr val="000000"/>
                   </a:solidFill>
                   <a:effectLst/>
                   <a:uLnTx/>
@@ -4143,14 +3647,14 @@
                   <a:ea typeface="HG明朝E" panose="02020909000000000000" pitchFamily="17" charset="-128"/>
                   <a:cs typeface="Arial" pitchFamily="34" charset="0"/>
                 </a:rPr>
-                <a:t>App Script</a:t>
+                <a:t>Thing</a:t>
               </a:r>
-              <a:endParaRPr kumimoji="0" lang="ja-JP" altLang="en-US" sz="600" b="0" i="0" u="none" strike="noStrike" kern="0" cap="none" spc="0" normalizeH="0" baseline="0" noProof="0" dirty="0" smtClean="0">
+              <a:endParaRPr kumimoji="0" lang="ja-JP" altLang="en-US" sz="1000" b="0" i="0" u="none" strike="noStrike" kern="0" cap="none" spc="0" normalizeH="0" baseline="0" noProof="0" dirty="0" smtClean="0">
                 <a:ln>
                   <a:noFill/>
                 </a:ln>
                 <a:solidFill>
-                  <a:prstClr val="white"/>
+                  <a:srgbClr val="000000"/>
                 </a:solidFill>
                 <a:effectLst/>
                 <a:uLnTx/>
@@ -4164,26 +3668,24 @@
         </p:sp>
         <p:sp>
           <p:nvSpPr>
-            <p:cNvPr id="112" name="角丸四角形 21"/>
+            <p:cNvPr id="96" name="角丸四角形 24"/>
             <p:cNvSpPr/>
             <p:nvPr/>
           </p:nvSpPr>
           <p:spPr bwMode="auto">
             <a:xfrm>
-              <a:off x="2912999" y="4396227"/>
-              <a:ext cx="1668143" cy="253545"/>
+              <a:off x="2912999" y="4905848"/>
+              <a:ext cx="1668143" cy="326741"/>
             </a:xfrm>
             <a:prstGeom prst="roundRect">
               <a:avLst/>
             </a:prstGeom>
             <a:solidFill>
-              <a:srgbClr val="7030A0"/>
+              <a:srgbClr val="92D050"/>
             </a:solidFill>
             <a:ln w="25400" cap="flat" cmpd="sng" algn="ctr">
               <a:solidFill>
-                <a:schemeClr val="accent4">
-                  <a:lumMod val="50000"/>
-                </a:schemeClr>
+                <a:srgbClr val="1BA12B"/>
               </a:solidFill>
               <a:prstDash val="solid"/>
               <a:round/>
@@ -4201,21 +3703,273 @@
             </a:bodyPr>
             <a:lstStyle/>
             <a:p>
-              <a:pPr algn="ctr" fontAlgn="ctr"/>
+              <a:pPr marL="0" marR="0" lvl="0" indent="0" algn="ctr" defTabSz="914400" eaLnBrk="1" fontAlgn="ctr" latinLnBrk="0" hangingPunct="1">
+                <a:lnSpc>
+                  <a:spcPct val="100000"/>
+                </a:lnSpc>
+                <a:spcBef>
+                  <a:spcPts val="0"/>
+                </a:spcBef>
+                <a:spcAft>
+                  <a:spcPts val="0"/>
+                </a:spcAft>
+                <a:buClrTx/>
+                <a:buSzTx/>
+                <a:buFontTx/>
+                <a:buNone/>
+                <a:tabLst/>
+                <a:defRPr/>
+              </a:pPr>
               <a:r>
-                <a:rPr lang="en-US" altLang="ja-JP" sz="600" dirty="0" smtClean="0">
+                <a:rPr kumimoji="0" lang="en-US" altLang="ja-JP" sz="800" b="0" i="0" u="none" strike="noStrike" kern="0" cap="none" spc="0" normalizeH="0" baseline="0" noProof="0" dirty="0" smtClean="0">
+                  <a:ln>
+                    <a:noFill/>
+                  </a:ln>
+                  <a:solidFill>
+                    <a:prstClr val="black"/>
+                  </a:solidFill>
+                  <a:effectLst/>
+                  <a:uLnTx/>
+                  <a:uFillTx/>
+                  <a:latin typeface="Arial" pitchFamily="34" charset="0"/>
+                  <a:ea typeface="HG明朝E" panose="02020909000000000000" pitchFamily="17" charset="-128"/>
+                  <a:cs typeface="Arial" pitchFamily="34" charset="0"/>
+                </a:rPr>
+                <a:t>Protocol </a:t>
+              </a:r>
+              <a:r>
+                <a:rPr kumimoji="0" lang="en-US" altLang="ja-JP" sz="800" b="0" i="0" u="none" strike="noStrike" kern="0" cap="none" spc="0" normalizeH="0" baseline="0" noProof="0" dirty="0" smtClean="0">
+                  <a:ln>
+                    <a:noFill/>
+                  </a:ln>
+                  <a:solidFill>
+                    <a:prstClr val="black"/>
+                  </a:solidFill>
+                  <a:effectLst/>
+                  <a:uLnTx/>
+                  <a:uFillTx/>
+                  <a:latin typeface="Arial" pitchFamily="34" charset="0"/>
+                  <a:ea typeface="HG明朝E" panose="02020909000000000000" pitchFamily="17" charset="-128"/>
+                  <a:cs typeface="Arial" pitchFamily="34" charset="0"/>
+                </a:rPr>
+                <a:t>Bindings</a:t>
+              </a:r>
+              <a:endParaRPr kumimoji="0" lang="ja-JP" altLang="en-US" sz="800" b="0" i="0" u="none" strike="noStrike" kern="0" cap="none" spc="0" normalizeH="0" baseline="0" noProof="0" dirty="0" smtClean="0">
+                <a:ln>
+                  <a:noFill/>
+                </a:ln>
+                <a:solidFill>
+                  <a:prstClr val="black"/>
+                </a:solidFill>
+                <a:effectLst/>
+                <a:uLnTx/>
+                <a:uFillTx/>
+                <a:latin typeface="Arial" pitchFamily="34" charset="0"/>
+                <a:ea typeface="HG明朝E" panose="02020909000000000000" pitchFamily="17" charset="-128"/>
+                <a:cs typeface="Arial" pitchFamily="34" charset="0"/>
+              </a:endParaRPr>
+            </a:p>
+          </p:txBody>
+        </p:sp>
+        <p:sp>
+          <p:nvSpPr>
+            <p:cNvPr id="97" name="角丸四角形 21"/>
+            <p:cNvSpPr/>
+            <p:nvPr/>
+          </p:nvSpPr>
+          <p:spPr bwMode="auto">
+            <a:xfrm>
+              <a:off x="2912999" y="4595156"/>
+              <a:ext cx="1668143" cy="285438"/>
+            </a:xfrm>
+            <a:prstGeom prst="roundRect">
+              <a:avLst/>
+            </a:prstGeom>
+            <a:solidFill>
+              <a:srgbClr val="0070C0"/>
+            </a:solidFill>
+            <a:ln w="25400" cap="flat" cmpd="sng" algn="ctr">
+              <a:solidFill>
+                <a:srgbClr val="0000FF"/>
+              </a:solidFill>
+              <a:prstDash val="solid"/>
+              <a:round/>
+              <a:headEnd type="none" w="med" len="med"/>
+              <a:tailEnd type="none" w="med" len="med"/>
+            </a:ln>
+            <a:effectLst/>
+            <a:extLst/>
+          </p:spPr>
+          <p:txBody>
+            <a:bodyPr vert="horz" wrap="square" lIns="91440" tIns="45720" rIns="91440" bIns="45720" numCol="1" rtlCol="0" anchor="ctr" anchorCtr="0" compatLnSpc="1">
+              <a:prstTxWarp prst="textNoShape">
+                <a:avLst/>
+              </a:prstTxWarp>
+            </a:bodyPr>
+            <a:lstStyle/>
+            <a:p>
+              <a:pPr marL="0" marR="0" lvl="0" indent="0" algn="ctr" defTabSz="914400" eaLnBrk="1" fontAlgn="ctr" latinLnBrk="0" hangingPunct="1">
+                <a:lnSpc>
+                  <a:spcPct val="100000"/>
+                </a:lnSpc>
+                <a:spcBef>
+                  <a:spcPts val="0"/>
+                </a:spcBef>
+                <a:spcAft>
+                  <a:spcPts val="0"/>
+                </a:spcAft>
+                <a:buClrTx/>
+                <a:buSzTx/>
+                <a:buFontTx/>
+                <a:buNone/>
+                <a:tabLst/>
+                <a:defRPr/>
+              </a:pPr>
+              <a:r>
+                <a:rPr kumimoji="0" lang="en-US" altLang="ja-JP" sz="800" b="0" i="0" u="none" strike="noStrike" kern="0" cap="none" spc="0" normalizeH="0" baseline="0" noProof="0" dirty="0" smtClean="0">
+                  <a:ln>
+                    <a:noFill/>
+                  </a:ln>
                   <a:solidFill>
                     <a:schemeClr val="bg1"/>
+                  </a:solidFill>
+                  <a:effectLst/>
+                  <a:uLnTx/>
+                  <a:uFillTx/>
+                  <a:latin typeface="Arial" pitchFamily="34" charset="0"/>
+                  <a:ea typeface="HG明朝E" panose="02020909000000000000" pitchFamily="17" charset="-128"/>
+                  <a:cs typeface="Arial" pitchFamily="34" charset="0"/>
+                </a:rPr>
+                <a:t>Resource</a:t>
+              </a:r>
+              <a:r>
+                <a:rPr kumimoji="0" lang="ja-JP" altLang="en-US" sz="800" b="0" i="0" u="none" strike="noStrike" kern="0" cap="none" spc="0" normalizeH="0" baseline="0" noProof="0" smtClean="0">
+                  <a:ln>
+                    <a:noFill/>
+                  </a:ln>
+                  <a:solidFill>
+                    <a:schemeClr val="bg1"/>
+                  </a:solidFill>
+                  <a:effectLst/>
+                  <a:uLnTx/>
+                  <a:uFillTx/>
+                  <a:latin typeface="Arial" pitchFamily="34" charset="0"/>
+                  <a:ea typeface="HG明朝E" panose="02020909000000000000" pitchFamily="17" charset="-128"/>
+                  <a:cs typeface="Arial" pitchFamily="34" charset="0"/>
+                </a:rPr>
+                <a:t> </a:t>
+              </a:r>
+              <a:r>
+                <a:rPr kumimoji="0" lang="en-US" altLang="ja-JP" sz="800" b="0" i="0" u="none" strike="noStrike" kern="0" cap="none" spc="0" normalizeH="0" baseline="0" noProof="0" dirty="0" smtClean="0">
+                  <a:ln>
+                    <a:noFill/>
+                  </a:ln>
+                  <a:solidFill>
+                    <a:schemeClr val="bg1"/>
+                  </a:solidFill>
+                  <a:effectLst/>
+                  <a:uLnTx/>
+                  <a:uFillTx/>
+                  <a:latin typeface="Arial" pitchFamily="34" charset="0"/>
+                  <a:ea typeface="HG明朝E" panose="02020909000000000000" pitchFamily="17" charset="-128"/>
+                  <a:cs typeface="Arial" pitchFamily="34" charset="0"/>
+                </a:rPr>
+                <a:t>Model</a:t>
+              </a:r>
+              <a:endParaRPr kumimoji="0" lang="ja-JP" altLang="en-US" sz="800" b="0" i="0" u="none" strike="noStrike" kern="0" cap="none" spc="0" normalizeH="0" baseline="0" noProof="0" dirty="0" smtClean="0">
+                <a:ln>
+                  <a:noFill/>
+                </a:ln>
+                <a:solidFill>
+                  <a:schemeClr val="bg1"/>
+                </a:solidFill>
+                <a:effectLst/>
+                <a:uLnTx/>
+                <a:uFillTx/>
+                <a:latin typeface="Arial" pitchFamily="34" charset="0"/>
+                <a:ea typeface="HG明朝E" panose="02020909000000000000" pitchFamily="17" charset="-128"/>
+                <a:cs typeface="Arial" pitchFamily="34" charset="0"/>
+              </a:endParaRPr>
+            </a:p>
+          </p:txBody>
+        </p:sp>
+        <p:sp>
+          <p:nvSpPr>
+            <p:cNvPr id="98" name="縦巻き 49"/>
+            <p:cNvSpPr/>
+            <p:nvPr/>
+          </p:nvSpPr>
+          <p:spPr bwMode="auto">
+            <a:xfrm>
+              <a:off x="2912999" y="4054908"/>
+              <a:ext cx="1668143" cy="500211"/>
+            </a:xfrm>
+            <a:prstGeom prst="verticalScroll">
+              <a:avLst/>
+            </a:prstGeom>
+            <a:solidFill>
+              <a:srgbClr val="7030A0"/>
+            </a:solidFill>
+            <a:ln w="9525" cap="flat" cmpd="sng" algn="ctr">
+              <a:solidFill>
+                <a:schemeClr val="accent4">
+                  <a:lumMod val="50000"/>
+                </a:schemeClr>
+              </a:solidFill>
+              <a:prstDash val="solid"/>
+              <a:round/>
+              <a:headEnd type="none" w="med" len="med"/>
+              <a:tailEnd type="none" w="med" len="med"/>
+            </a:ln>
+            <a:effectLst/>
+            <a:extLst/>
+          </p:spPr>
+          <p:txBody>
+            <a:bodyPr vert="horz" wrap="none" lIns="91440" tIns="45720" rIns="91440" bIns="45720" numCol="1" rtlCol="0" anchor="ctr" anchorCtr="0" compatLnSpc="1">
+              <a:prstTxWarp prst="textNoShape">
+                <a:avLst/>
+              </a:prstTxWarp>
+            </a:bodyPr>
+            <a:lstStyle/>
+            <a:p>
+              <a:pPr lvl="0" algn="ctr" fontAlgn="ctr">
+                <a:defRPr/>
+              </a:pPr>
+              <a:r>
+                <a:rPr lang="en-US" altLang="ja-JP" sz="800" kern="0" dirty="0" smtClean="0">
+                  <a:solidFill>
+                    <a:prstClr val="white"/>
                   </a:solidFill>
                   <a:latin typeface="Arial" pitchFamily="34" charset="0"/>
                   <a:ea typeface="HG明朝E" panose="02020909000000000000" pitchFamily="17" charset="-128"/>
                   <a:cs typeface="Arial" pitchFamily="34" charset="0"/>
                 </a:rPr>
-                <a:t>Runtime Environment</a:t>
+                <a:t>App Script with</a:t>
               </a:r>
-              <a:endParaRPr lang="ja-JP" altLang="en-US" sz="600" dirty="0" smtClean="0">
+              <a:br>
+                <a:rPr lang="en-US" altLang="ja-JP" sz="800" kern="0" dirty="0" smtClean="0">
+                  <a:solidFill>
+                    <a:prstClr val="white"/>
+                  </a:solidFill>
+                  <a:latin typeface="Arial" pitchFamily="34" charset="0"/>
+                  <a:ea typeface="HG明朝E" panose="02020909000000000000" pitchFamily="17" charset="-128"/>
+                  <a:cs typeface="Arial" pitchFamily="34" charset="0"/>
+                </a:rPr>
+              </a:br>
+              <a:r>
+                <a:rPr lang="en-US" altLang="ja-JP" sz="800" kern="0" dirty="0" smtClean="0">
+                  <a:solidFill>
+                    <a:prstClr val="white"/>
+                  </a:solidFill>
+                  <a:latin typeface="Arial" pitchFamily="34" charset="0"/>
+                  <a:ea typeface="HG明朝E" panose="02020909000000000000" pitchFamily="17" charset="-128"/>
+                  <a:cs typeface="Arial" pitchFamily="34" charset="0"/>
+                </a:rPr>
+                <a:t>Software Objects</a:t>
+              </a:r>
+              <a:endParaRPr lang="ja-JP" altLang="en-US" sz="800" kern="0" dirty="0" smtClean="0">
                 <a:solidFill>
-                  <a:schemeClr val="bg1"/>
+                  <a:prstClr val="white"/>
                 </a:solidFill>
                 <a:latin typeface="Arial" pitchFamily="34" charset="0"/>
                 <a:ea typeface="HG明朝E" panose="02020909000000000000" pitchFamily="17" charset="-128"/>
@@ -4224,28 +3978,85 @@
             </a:p>
           </p:txBody>
         </p:sp>
-        <p:cxnSp>
-          <p:nvCxnSpPr>
-            <p:cNvPr id="113" name="直線矢印コネクタ 72"/>
-            <p:cNvCxnSpPr/>
+      </p:grpSp>
+      <p:grpSp>
+        <p:nvGrpSpPr>
+          <p:cNvPr id="89" name="Gruppieren 88"/>
+          <p:cNvGrpSpPr/>
+          <p:nvPr/>
+        </p:nvGrpSpPr>
+        <p:grpSpPr>
+          <a:xfrm>
+            <a:off x="5652120" y="2348880"/>
+            <a:ext cx="1190046" cy="1033483"/>
+            <a:chOff x="2828012" y="3702859"/>
+            <a:chExt cx="1838118" cy="1596294"/>
+          </a:xfrm>
+        </p:grpSpPr>
+        <p:sp>
+          <p:nvSpPr>
+            <p:cNvPr id="90" name="角丸四角形 6"/>
+            <p:cNvSpPr/>
             <p:nvPr/>
-          </p:nvCxnSpPr>
+          </p:nvSpPr>
           <p:spPr bwMode="auto">
             <a:xfrm>
-              <a:off x="4182163" y="4209096"/>
-              <a:ext cx="0" cy="217391"/>
+              <a:off x="2828012" y="3702859"/>
+              <a:ext cx="1838118" cy="1596294"/>
             </a:xfrm>
-            <a:prstGeom prst="straightConnector1">
-              <a:avLst/>
+            <a:prstGeom prst="roundRect">
+              <a:avLst>
+                <a:gd name="adj" fmla="val 6113"/>
+              </a:avLst>
             </a:prstGeom>
-            <a:noFill/>
-            <a:ln w="19050" cap="flat" cmpd="sng" algn="ctr">
+            <a:gradFill rotWithShape="1">
+              <a:gsLst>
+                <a:gs pos="0">
+                  <a:sysClr val="windowText" lastClr="000000">
+                    <a:tint val="45000"/>
+                    <a:satMod val="200000"/>
+                  </a:sysClr>
+                </a:gs>
+                <a:gs pos="30000">
+                  <a:sysClr val="windowText" lastClr="000000">
+                    <a:tint val="61000"/>
+                    <a:satMod val="200000"/>
+                  </a:sysClr>
+                </a:gs>
+                <a:gs pos="45000">
+                  <a:sysClr val="windowText" lastClr="000000">
+                    <a:tint val="66000"/>
+                    <a:satMod val="200000"/>
+                  </a:sysClr>
+                </a:gs>
+                <a:gs pos="55000">
+                  <a:sysClr val="windowText" lastClr="000000">
+                    <a:tint val="66000"/>
+                    <a:satMod val="200000"/>
+                  </a:sysClr>
+                </a:gs>
+                <a:gs pos="73000">
+                  <a:sysClr val="windowText" lastClr="000000">
+                    <a:tint val="61000"/>
+                    <a:satMod val="200000"/>
+                  </a:sysClr>
+                </a:gs>
+                <a:gs pos="100000">
+                  <a:sysClr val="windowText" lastClr="000000">
+                    <a:tint val="45000"/>
+                    <a:satMod val="200000"/>
+                  </a:sysClr>
+                </a:gs>
+              </a:gsLst>
+              <a:lin ang="950000" scaled="1"/>
+            </a:gradFill>
+            <a:ln w="9525" cap="flat" cmpd="sng" algn="ctr">
               <a:solidFill>
                 <a:sysClr val="windowText" lastClr="000000"/>
               </a:solidFill>
               <a:prstDash val="solid"/>
-              <a:headEnd type="triangle" w="med" len="sm"/>
-              <a:tailEnd type="triangle" w="med" len="sm"/>
+              <a:headEnd type="none" w="med" len="med"/>
+              <a:tailEnd type="none" w="med" len="med"/>
             </a:ln>
             <a:effectLst>
               <a:outerShdw blurRad="38100" dist="25400" dir="5400000" rotWithShape="0">
@@ -4256,41 +4067,525 @@
             </a:effectLst>
             <a:extLst/>
           </p:spPr>
-        </p:cxnSp>
-        <p:cxnSp>
-          <p:nvCxnSpPr>
-            <p:cNvPr id="114" name="直線矢印コネクタ 75"/>
-            <p:cNvCxnSpPr/>
+          <p:txBody>
+            <a:bodyPr vert="horz" wrap="none" lIns="91440" tIns="36000" rIns="91440" bIns="36000" numCol="1" rtlCol="0" anchor="t" anchorCtr="0" compatLnSpc="1">
+              <a:prstTxWarp prst="textNoShape">
+                <a:avLst/>
+              </a:prstTxWarp>
+            </a:bodyPr>
+            <a:lstStyle/>
+            <a:p>
+              <a:pPr marL="0" marR="0" lvl="0" indent="0" algn="ctr" defTabSz="914400" eaLnBrk="1" fontAlgn="ctr" latinLnBrk="0" hangingPunct="1">
+                <a:lnSpc>
+                  <a:spcPct val="100000"/>
+                </a:lnSpc>
+                <a:spcBef>
+                  <a:spcPts val="0"/>
+                </a:spcBef>
+                <a:spcAft>
+                  <a:spcPts val="0"/>
+                </a:spcAft>
+                <a:buClrTx/>
+                <a:buSzTx/>
+                <a:buFontTx/>
+                <a:buNone/>
+                <a:tabLst/>
+                <a:defRPr/>
+              </a:pPr>
+              <a:r>
+                <a:rPr kumimoji="0" lang="en-US" altLang="ja-JP" sz="1000" b="0" i="0" u="none" strike="noStrike" kern="0" cap="none" spc="0" normalizeH="0" baseline="0" noProof="0" dirty="0" smtClean="0">
+                  <a:ln>
+                    <a:noFill/>
+                  </a:ln>
+                  <a:solidFill>
+                    <a:srgbClr val="000000"/>
+                  </a:solidFill>
+                  <a:effectLst/>
+                  <a:uLnTx/>
+                  <a:uFillTx/>
+                  <a:latin typeface="Arial" pitchFamily="34" charset="0"/>
+                  <a:ea typeface="HG明朝E" panose="02020909000000000000" pitchFamily="17" charset="-128"/>
+                  <a:cs typeface="Arial" pitchFamily="34" charset="0"/>
+                </a:rPr>
+                <a:t>Thing</a:t>
+              </a:r>
+              <a:endParaRPr kumimoji="0" lang="ja-JP" altLang="en-US" sz="1000" b="0" i="0" u="none" strike="noStrike" kern="0" cap="none" spc="0" normalizeH="0" baseline="0" noProof="0" dirty="0" smtClean="0">
+                <a:ln>
+                  <a:noFill/>
+                </a:ln>
+                <a:solidFill>
+                  <a:srgbClr val="000000"/>
+                </a:solidFill>
+                <a:effectLst/>
+                <a:uLnTx/>
+                <a:uFillTx/>
+                <a:latin typeface="Arial" pitchFamily="34" charset="0"/>
+                <a:ea typeface="HG明朝E" panose="02020909000000000000" pitchFamily="17" charset="-128"/>
+                <a:cs typeface="Arial" pitchFamily="34" charset="0"/>
+              </a:endParaRPr>
+            </a:p>
+          </p:txBody>
+        </p:sp>
+        <p:sp>
+          <p:nvSpPr>
+            <p:cNvPr id="91" name="角丸四角形 24"/>
+            <p:cNvSpPr/>
             <p:nvPr/>
-          </p:nvCxnSpPr>
+          </p:nvSpPr>
           <p:spPr bwMode="auto">
             <a:xfrm>
-              <a:off x="3318068" y="4209096"/>
-              <a:ext cx="0" cy="217391"/>
+              <a:off x="2912999" y="4905848"/>
+              <a:ext cx="1668143" cy="326741"/>
             </a:xfrm>
-            <a:prstGeom prst="straightConnector1">
+            <a:prstGeom prst="roundRect">
               <a:avLst/>
             </a:prstGeom>
-            <a:noFill/>
-            <a:ln w="19050" cap="flat" cmpd="sng" algn="ctr">
+            <a:solidFill>
+              <a:srgbClr val="92D050"/>
+            </a:solidFill>
+            <a:ln w="25400" cap="flat" cmpd="sng" algn="ctr">
               <a:solidFill>
-                <a:sysClr val="windowText" lastClr="000000"/>
+                <a:srgbClr val="1BA12B"/>
               </a:solidFill>
               <a:prstDash val="solid"/>
-              <a:headEnd type="triangle" w="med" len="sm"/>
-              <a:tailEnd type="triangle" w="med" len="sm"/>
+              <a:round/>
+              <a:headEnd type="none" w="med" len="med"/>
+              <a:tailEnd type="none" w="med" len="med"/>
             </a:ln>
-            <a:effectLst>
-              <a:outerShdw blurRad="38100" dist="25400" dir="5400000" rotWithShape="0">
-                <a:srgbClr val="000000">
-                  <a:alpha val="40000"/>
-                </a:srgbClr>
-              </a:outerShdw>
-            </a:effectLst>
+            <a:effectLst/>
             <a:extLst/>
           </p:spPr>
-        </p:cxnSp>
+          <p:txBody>
+            <a:bodyPr vert="horz" wrap="square" lIns="91440" tIns="45720" rIns="91440" bIns="45720" numCol="1" rtlCol="0" anchor="ctr" anchorCtr="0" compatLnSpc="1">
+              <a:prstTxWarp prst="textNoShape">
+                <a:avLst/>
+              </a:prstTxWarp>
+            </a:bodyPr>
+            <a:lstStyle/>
+            <a:p>
+              <a:pPr marL="0" marR="0" lvl="0" indent="0" algn="ctr" defTabSz="914400" eaLnBrk="1" fontAlgn="ctr" latinLnBrk="0" hangingPunct="1">
+                <a:lnSpc>
+                  <a:spcPct val="100000"/>
+                </a:lnSpc>
+                <a:spcBef>
+                  <a:spcPts val="0"/>
+                </a:spcBef>
+                <a:spcAft>
+                  <a:spcPts val="0"/>
+                </a:spcAft>
+                <a:buClrTx/>
+                <a:buSzTx/>
+                <a:buFontTx/>
+                <a:buNone/>
+                <a:tabLst/>
+                <a:defRPr/>
+              </a:pPr>
+              <a:r>
+                <a:rPr kumimoji="0" lang="en-US" altLang="ja-JP" sz="800" b="0" i="0" u="none" strike="noStrike" kern="0" cap="none" spc="0" normalizeH="0" baseline="0" noProof="0" dirty="0" smtClean="0">
+                  <a:ln>
+                    <a:noFill/>
+                  </a:ln>
+                  <a:solidFill>
+                    <a:prstClr val="black"/>
+                  </a:solidFill>
+                  <a:effectLst/>
+                  <a:uLnTx/>
+                  <a:uFillTx/>
+                  <a:latin typeface="Arial" pitchFamily="34" charset="0"/>
+                  <a:ea typeface="HG明朝E" panose="02020909000000000000" pitchFamily="17" charset="-128"/>
+                  <a:cs typeface="Arial" pitchFamily="34" charset="0"/>
+                </a:rPr>
+                <a:t>Protocol </a:t>
+              </a:r>
+              <a:r>
+                <a:rPr kumimoji="0" lang="en-US" altLang="ja-JP" sz="800" b="0" i="0" u="none" strike="noStrike" kern="0" cap="none" spc="0" normalizeH="0" baseline="0" noProof="0" dirty="0" smtClean="0">
+                  <a:ln>
+                    <a:noFill/>
+                  </a:ln>
+                  <a:solidFill>
+                    <a:prstClr val="black"/>
+                  </a:solidFill>
+                  <a:effectLst/>
+                  <a:uLnTx/>
+                  <a:uFillTx/>
+                  <a:latin typeface="Arial" pitchFamily="34" charset="0"/>
+                  <a:ea typeface="HG明朝E" panose="02020909000000000000" pitchFamily="17" charset="-128"/>
+                  <a:cs typeface="Arial" pitchFamily="34" charset="0"/>
+                </a:rPr>
+                <a:t>Bindings</a:t>
+              </a:r>
+              <a:endParaRPr kumimoji="0" lang="ja-JP" altLang="en-US" sz="800" b="0" i="0" u="none" strike="noStrike" kern="0" cap="none" spc="0" normalizeH="0" baseline="0" noProof="0" dirty="0" smtClean="0">
+                <a:ln>
+                  <a:noFill/>
+                </a:ln>
+                <a:solidFill>
+                  <a:prstClr val="black"/>
+                </a:solidFill>
+                <a:effectLst/>
+                <a:uLnTx/>
+                <a:uFillTx/>
+                <a:latin typeface="Arial" pitchFamily="34" charset="0"/>
+                <a:ea typeface="HG明朝E" panose="02020909000000000000" pitchFamily="17" charset="-128"/>
+                <a:cs typeface="Arial" pitchFamily="34" charset="0"/>
+              </a:endParaRPr>
+            </a:p>
+          </p:txBody>
+        </p:sp>
+        <p:sp>
+          <p:nvSpPr>
+            <p:cNvPr id="92" name="角丸四角形 21"/>
+            <p:cNvSpPr/>
+            <p:nvPr/>
+          </p:nvSpPr>
+          <p:spPr bwMode="auto">
+            <a:xfrm>
+              <a:off x="2912999" y="4595156"/>
+              <a:ext cx="1668143" cy="285438"/>
+            </a:xfrm>
+            <a:prstGeom prst="roundRect">
+              <a:avLst/>
+            </a:prstGeom>
+            <a:solidFill>
+              <a:srgbClr val="0070C0"/>
+            </a:solidFill>
+            <a:ln w="25400" cap="flat" cmpd="sng" algn="ctr">
+              <a:solidFill>
+                <a:srgbClr val="0000FF"/>
+              </a:solidFill>
+              <a:prstDash val="solid"/>
+              <a:round/>
+              <a:headEnd type="none" w="med" len="med"/>
+              <a:tailEnd type="none" w="med" len="med"/>
+            </a:ln>
+            <a:effectLst/>
+            <a:extLst/>
+          </p:spPr>
+          <p:txBody>
+            <a:bodyPr vert="horz" wrap="square" lIns="91440" tIns="45720" rIns="91440" bIns="45720" numCol="1" rtlCol="0" anchor="ctr" anchorCtr="0" compatLnSpc="1">
+              <a:prstTxWarp prst="textNoShape">
+                <a:avLst/>
+              </a:prstTxWarp>
+            </a:bodyPr>
+            <a:lstStyle/>
+            <a:p>
+              <a:pPr marL="0" marR="0" lvl="0" indent="0" algn="ctr" defTabSz="914400" eaLnBrk="1" fontAlgn="ctr" latinLnBrk="0" hangingPunct="1">
+                <a:lnSpc>
+                  <a:spcPct val="100000"/>
+                </a:lnSpc>
+                <a:spcBef>
+                  <a:spcPts val="0"/>
+                </a:spcBef>
+                <a:spcAft>
+                  <a:spcPts val="0"/>
+                </a:spcAft>
+                <a:buClrTx/>
+                <a:buSzTx/>
+                <a:buFontTx/>
+                <a:buNone/>
+                <a:tabLst/>
+                <a:defRPr/>
+              </a:pPr>
+              <a:r>
+                <a:rPr kumimoji="0" lang="en-US" altLang="ja-JP" sz="800" b="0" i="0" u="none" strike="noStrike" kern="0" cap="none" spc="0" normalizeH="0" baseline="0" noProof="0" dirty="0" smtClean="0">
+                  <a:ln>
+                    <a:noFill/>
+                  </a:ln>
+                  <a:solidFill>
+                    <a:schemeClr val="bg1"/>
+                  </a:solidFill>
+                  <a:effectLst/>
+                  <a:uLnTx/>
+                  <a:uFillTx/>
+                  <a:latin typeface="Arial" pitchFamily="34" charset="0"/>
+                  <a:ea typeface="HG明朝E" panose="02020909000000000000" pitchFamily="17" charset="-128"/>
+                  <a:cs typeface="Arial" pitchFamily="34" charset="0"/>
+                </a:rPr>
+                <a:t>Resource</a:t>
+              </a:r>
+              <a:r>
+                <a:rPr kumimoji="0" lang="ja-JP" altLang="en-US" sz="800" b="0" i="0" u="none" strike="noStrike" kern="0" cap="none" spc="0" normalizeH="0" baseline="0" noProof="0" smtClean="0">
+                  <a:ln>
+                    <a:noFill/>
+                  </a:ln>
+                  <a:solidFill>
+                    <a:schemeClr val="bg1"/>
+                  </a:solidFill>
+                  <a:effectLst/>
+                  <a:uLnTx/>
+                  <a:uFillTx/>
+                  <a:latin typeface="Arial" pitchFamily="34" charset="0"/>
+                  <a:ea typeface="HG明朝E" panose="02020909000000000000" pitchFamily="17" charset="-128"/>
+                  <a:cs typeface="Arial" pitchFamily="34" charset="0"/>
+                </a:rPr>
+                <a:t> </a:t>
+              </a:r>
+              <a:r>
+                <a:rPr kumimoji="0" lang="en-US" altLang="ja-JP" sz="800" b="0" i="0" u="none" strike="noStrike" kern="0" cap="none" spc="0" normalizeH="0" baseline="0" noProof="0" dirty="0" smtClean="0">
+                  <a:ln>
+                    <a:noFill/>
+                  </a:ln>
+                  <a:solidFill>
+                    <a:schemeClr val="bg1"/>
+                  </a:solidFill>
+                  <a:effectLst/>
+                  <a:uLnTx/>
+                  <a:uFillTx/>
+                  <a:latin typeface="Arial" pitchFamily="34" charset="0"/>
+                  <a:ea typeface="HG明朝E" panose="02020909000000000000" pitchFamily="17" charset="-128"/>
+                  <a:cs typeface="Arial" pitchFamily="34" charset="0"/>
+                </a:rPr>
+                <a:t>Model</a:t>
+              </a:r>
+              <a:endParaRPr kumimoji="0" lang="ja-JP" altLang="en-US" sz="800" b="0" i="0" u="none" strike="noStrike" kern="0" cap="none" spc="0" normalizeH="0" baseline="0" noProof="0" dirty="0" smtClean="0">
+                <a:ln>
+                  <a:noFill/>
+                </a:ln>
+                <a:solidFill>
+                  <a:schemeClr val="bg1"/>
+                </a:solidFill>
+                <a:effectLst/>
+                <a:uLnTx/>
+                <a:uFillTx/>
+                <a:latin typeface="Arial" pitchFamily="34" charset="0"/>
+                <a:ea typeface="HG明朝E" panose="02020909000000000000" pitchFamily="17" charset="-128"/>
+                <a:cs typeface="Arial" pitchFamily="34" charset="0"/>
+              </a:endParaRPr>
+            </a:p>
+          </p:txBody>
+        </p:sp>
+        <p:sp>
+          <p:nvSpPr>
+            <p:cNvPr id="93" name="縦巻き 49"/>
+            <p:cNvSpPr/>
+            <p:nvPr/>
+          </p:nvSpPr>
+          <p:spPr bwMode="auto">
+            <a:xfrm>
+              <a:off x="2912999" y="4054908"/>
+              <a:ext cx="1668143" cy="500211"/>
+            </a:xfrm>
+            <a:prstGeom prst="verticalScroll">
+              <a:avLst/>
+            </a:prstGeom>
+            <a:solidFill>
+              <a:srgbClr val="7030A0"/>
+            </a:solidFill>
+            <a:ln w="9525" cap="flat" cmpd="sng" algn="ctr">
+              <a:solidFill>
+                <a:schemeClr val="accent4">
+                  <a:lumMod val="50000"/>
+                </a:schemeClr>
+              </a:solidFill>
+              <a:prstDash val="solid"/>
+              <a:round/>
+              <a:headEnd type="none" w="med" len="med"/>
+              <a:tailEnd type="none" w="med" len="med"/>
+            </a:ln>
+            <a:effectLst/>
+            <a:extLst/>
+          </p:spPr>
+          <p:txBody>
+            <a:bodyPr vert="horz" wrap="none" lIns="91440" tIns="45720" rIns="91440" bIns="45720" numCol="1" rtlCol="0" anchor="ctr" anchorCtr="0" compatLnSpc="1">
+              <a:prstTxWarp prst="textNoShape">
+                <a:avLst/>
+              </a:prstTxWarp>
+            </a:bodyPr>
+            <a:lstStyle/>
+            <a:p>
+              <a:pPr lvl="0" algn="ctr" fontAlgn="ctr">
+                <a:defRPr/>
+              </a:pPr>
+              <a:r>
+                <a:rPr lang="en-US" altLang="ja-JP" sz="800" kern="0" dirty="0" smtClean="0">
+                  <a:solidFill>
+                    <a:prstClr val="white"/>
+                  </a:solidFill>
+                  <a:latin typeface="Arial" pitchFamily="34" charset="0"/>
+                  <a:ea typeface="HG明朝E" panose="02020909000000000000" pitchFamily="17" charset="-128"/>
+                  <a:cs typeface="Arial" pitchFamily="34" charset="0"/>
+                </a:rPr>
+                <a:t>App Script with</a:t>
+              </a:r>
+              <a:br>
+                <a:rPr lang="en-US" altLang="ja-JP" sz="800" kern="0" dirty="0" smtClean="0">
+                  <a:solidFill>
+                    <a:prstClr val="white"/>
+                  </a:solidFill>
+                  <a:latin typeface="Arial" pitchFamily="34" charset="0"/>
+                  <a:ea typeface="HG明朝E" panose="02020909000000000000" pitchFamily="17" charset="-128"/>
+                  <a:cs typeface="Arial" pitchFamily="34" charset="0"/>
+                </a:rPr>
+              </a:br>
+              <a:r>
+                <a:rPr lang="en-US" altLang="ja-JP" sz="800" kern="0" dirty="0" smtClean="0">
+                  <a:solidFill>
+                    <a:prstClr val="white"/>
+                  </a:solidFill>
+                  <a:latin typeface="Arial" pitchFamily="34" charset="0"/>
+                  <a:ea typeface="HG明朝E" panose="02020909000000000000" pitchFamily="17" charset="-128"/>
+                  <a:cs typeface="Arial" pitchFamily="34" charset="0"/>
+                </a:rPr>
+                <a:t>Software Objects</a:t>
+              </a:r>
+              <a:endParaRPr lang="ja-JP" altLang="en-US" sz="800" kern="0" dirty="0" smtClean="0">
+                <a:solidFill>
+                  <a:prstClr val="white"/>
+                </a:solidFill>
+                <a:latin typeface="Arial" pitchFamily="34" charset="0"/>
+                <a:ea typeface="HG明朝E" panose="02020909000000000000" pitchFamily="17" charset="-128"/>
+                <a:cs typeface="Arial" pitchFamily="34" charset="0"/>
+              </a:endParaRPr>
+            </a:p>
+          </p:txBody>
+        </p:sp>
       </p:grpSp>
+      <p:pic>
+        <p:nvPicPr>
+          <p:cNvPr id="1027" name="Picture 3" descr="D:\Projects\W3C\wot\charters\firewall.png"/>
+          <p:cNvPicPr>
+            <a:picLocks noChangeAspect="1" noChangeArrowheads="1"/>
+          </p:cNvPicPr>
+          <p:nvPr/>
+        </p:nvPicPr>
+        <p:blipFill>
+          <a:blip r:embed="rId2" cstate="print"/>
+          <a:srcRect/>
+          <a:stretch>
+            <a:fillRect/>
+          </a:stretch>
+        </p:blipFill>
+        <p:spPr bwMode="auto">
+          <a:xfrm>
+            <a:off x="4634483" y="1802380"/>
+            <a:ext cx="936104" cy="811290"/>
+          </a:xfrm>
+          <a:prstGeom prst="rect">
+            <a:avLst/>
+          </a:prstGeom>
+          <a:noFill/>
+        </p:spPr>
+      </p:pic>
+      <p:pic>
+        <p:nvPicPr>
+          <p:cNvPr id="60" name="図 77"/>
+          <p:cNvPicPr>
+            <a:picLocks noChangeAspect="1"/>
+          </p:cNvPicPr>
+          <p:nvPr/>
+        </p:nvPicPr>
+        <p:blipFill>
+          <a:blip r:embed="rId3" cstate="print">
+            <a:extLst>
+              <a:ext uri="{28A0092B-C50C-407E-A947-70E740481C1C}">
+                <a14:useLocalDpi xmlns="" xmlns:a14="http://schemas.microsoft.com/office/drawing/2010/main" val="0"/>
+              </a:ext>
+            </a:extLst>
+          </a:blip>
+          <a:stretch>
+            <a:fillRect/>
+          </a:stretch>
+        </p:blipFill>
+        <p:spPr>
+          <a:xfrm>
+            <a:off x="1278682" y="4400283"/>
+            <a:ext cx="650213" cy="540885"/>
+          </a:xfrm>
+          <a:prstGeom prst="rect">
+            <a:avLst/>
+          </a:prstGeom>
+        </p:spPr>
+      </p:pic>
+      <p:sp>
+        <p:nvSpPr>
+          <p:cNvPr id="11" name="雲 41"/>
+          <p:cNvSpPr/>
+          <p:nvPr/>
+        </p:nvSpPr>
+        <p:spPr bwMode="gray">
+          <a:xfrm>
+            <a:off x="1043608" y="1052736"/>
+            <a:ext cx="3656521" cy="2448272"/>
+          </a:xfrm>
+          <a:prstGeom prst="cloud">
+            <a:avLst/>
+          </a:prstGeom>
+          <a:solidFill>
+            <a:srgbClr val="DAD9D6"/>
+          </a:solidFill>
+          <a:ln w="9525" cap="flat" cmpd="sng" algn="ctr">
+            <a:solidFill>
+              <a:srgbClr val="B1B1AC"/>
+            </a:solidFill>
+            <a:prstDash val="solid"/>
+            <a:round/>
+            <a:headEnd type="none" w="med" len="med"/>
+            <a:tailEnd type="none" w="med" len="med"/>
+          </a:ln>
+          <a:effectLst/>
+          <a:extLst>
+            <a:ext uri="{AF507438-7753-43E0-B8FC-AC1667EBCBE1}">
+              <a14:hiddenEffects xmlns="" xmlns:a14="http://schemas.microsoft.com/office/drawing/2010/main">
+                <a:effectLst>
+                  <a:outerShdw dist="53882" dir="2700000" algn="ctr" rotWithShape="0">
+                    <a:schemeClr val="bg2">
+                      <a:alpha val="50000"/>
+                    </a:schemeClr>
+                  </a:outerShdw>
+                </a:effectLst>
+              </a14:hiddenEffects>
+            </a:ext>
+          </a:extLst>
+        </p:spPr>
+        <p:txBody>
+          <a:bodyPr rot="0" spcFirstLastPara="0" vertOverflow="overflow" horzOverflow="overflow" vert="horz" wrap="none" lIns="91440" tIns="45720" rIns="91440" bIns="45720" numCol="1" spcCol="0" rtlCol="0" fromWordArt="0" anchor="b" anchorCtr="0" forceAA="0" compatLnSpc="1">
+            <a:prstTxWarp prst="textNoShape">
+              <a:avLst/>
+            </a:prstTxWarp>
+            <a:noAutofit/>
+          </a:bodyPr>
+          <a:lstStyle/>
+          <a:p>
+            <a:pPr algn="ctr" fontAlgn="ctr"/>
+            <a:endParaRPr lang="ja-JP" altLang="en-US" sz="1800" dirty="0" err="1" smtClean="0">
+              <a:solidFill>
+                <a:prstClr val="black"/>
+              </a:solidFill>
+              <a:latin typeface="Gill Sans MT"/>
+              <a:ea typeface="ＭＳ Ｐゴシック" panose="020B0600070205080204" pitchFamily="50" charset="-128"/>
+            </a:endParaRPr>
+          </a:p>
+        </p:txBody>
+      </p:sp>
+      <p:pic>
+        <p:nvPicPr>
+          <p:cNvPr id="40" name="図 78"/>
+          <p:cNvPicPr>
+            <a:picLocks noChangeAspect="1"/>
+          </p:cNvPicPr>
+          <p:nvPr/>
+        </p:nvPicPr>
+        <p:blipFill>
+          <a:blip r:embed="rId4" cstate="print">
+            <a:extLst>
+              <a:ext uri="{28A0092B-C50C-407E-A947-70E740481C1C}">
+                <a14:useLocalDpi xmlns="" xmlns:a14="http://schemas.microsoft.com/office/drawing/2010/main" val="0"/>
+              </a:ext>
+            </a:extLst>
+          </a:blip>
+          <a:stretch>
+            <a:fillRect/>
+          </a:stretch>
+        </p:blipFill>
+        <p:spPr>
+          <a:xfrm>
+            <a:off x="1710730" y="4048388"/>
+            <a:ext cx="413874" cy="603217"/>
+          </a:xfrm>
+          <a:prstGeom prst="rect">
+            <a:avLst/>
+          </a:prstGeom>
+        </p:spPr>
+      </p:pic>
       <p:sp>
         <p:nvSpPr>
           <p:cNvPr id="115" name="角丸四角形 49"/>
@@ -4374,7 +4669,7 @@
           <a:blip r:embed="rId5" cstate="print">
             <a:extLst>
               <a:ext uri="{28A0092B-C50C-407E-A947-70E740481C1C}">
-                <a14:useLocalDpi xmlns:a14="http://schemas.microsoft.com/office/drawing/2010/main" xmlns="" val="0"/>
+                <a14:useLocalDpi xmlns="" xmlns:a14="http://schemas.microsoft.com/office/drawing/2010/main" val="0"/>
               </a:ext>
             </a:extLst>
           </a:blip>
@@ -4506,23 +4801,6 @@
                 <a:defRPr/>
               </a:pPr>
               <a:r>
-                <a:rPr kumimoji="0" lang="en-US" altLang="ja-JP" sz="1000" b="0" i="0" u="none" strike="noStrike" kern="0" cap="none" spc="0" normalizeH="0" baseline="0" noProof="0" dirty="0" err="1" smtClean="0">
-                  <a:ln>
-                    <a:noFill/>
-                  </a:ln>
-                  <a:solidFill>
-                    <a:srgbClr val="000000"/>
-                  </a:solidFill>
-                  <a:effectLst/>
-                  <a:uLnTx/>
-                  <a:uFillTx/>
-                  <a:latin typeface="Arial" pitchFamily="34" charset="0"/>
-                  <a:ea typeface="HG明朝E" panose="02020909000000000000" pitchFamily="17" charset="-128"/>
-                  <a:cs typeface="Arial" pitchFamily="34" charset="0"/>
-                </a:rPr>
-                <a:t>WoT</a:t>
-              </a:r>
-              <a:r>
                 <a:rPr kumimoji="0" lang="en-US" altLang="ja-JP" sz="1000" b="0" i="0" u="none" strike="noStrike" kern="0" cap="none" spc="0" normalizeH="0" baseline="0" noProof="0" dirty="0" smtClean="0">
                   <a:ln>
                     <a:noFill/>
@@ -4537,7 +4815,7 @@
                   <a:ea typeface="HG明朝E" panose="02020909000000000000" pitchFamily="17" charset="-128"/>
                   <a:cs typeface="Arial" pitchFamily="34" charset="0"/>
                 </a:rPr>
-                <a:t> Servient</a:t>
+                <a:t>Thing</a:t>
               </a:r>
               <a:endParaRPr kumimoji="0" lang="ja-JP" altLang="en-US" sz="1000" b="0" i="0" u="none" strike="noStrike" kern="0" cap="none" spc="0" normalizeH="0" baseline="0" noProof="0" dirty="0" smtClean="0">
                 <a:ln>
@@ -4564,8 +4842,8 @@
           </p:nvSpPr>
           <p:spPr bwMode="auto">
             <a:xfrm>
-              <a:off x="2912999" y="4942119"/>
-              <a:ext cx="1668143" cy="246334"/>
+              <a:off x="2912999" y="4905848"/>
+              <a:ext cx="1668143" cy="326741"/>
             </a:xfrm>
             <a:prstGeom prst="roundRect">
               <a:avLst/>
@@ -4611,7 +4889,7 @@
                 <a:defRPr/>
               </a:pPr>
               <a:r>
-                <a:rPr kumimoji="0" lang="en-US" altLang="ja-JP" sz="600" b="0" i="0" u="none" strike="noStrike" kern="0" cap="none" spc="0" normalizeH="0" baseline="0" noProof="0" dirty="0" smtClean="0">
+                <a:rPr kumimoji="0" lang="en-US" altLang="ja-JP" sz="800" b="0" i="0" u="none" strike="noStrike" kern="0" cap="none" spc="0" normalizeH="0" baseline="0" noProof="0" dirty="0" smtClean="0">
                   <a:ln>
                     <a:noFill/>
                   </a:ln>
@@ -4625,9 +4903,26 @@
                   <a:ea typeface="HG明朝E" panose="02020909000000000000" pitchFamily="17" charset="-128"/>
                   <a:cs typeface="Arial" pitchFamily="34" charset="0"/>
                 </a:rPr>
-                <a:t>Protocol Bindings</a:t>
+                <a:t>Protocol </a:t>
               </a:r>
-              <a:endParaRPr kumimoji="0" lang="ja-JP" altLang="en-US" sz="600" b="0" i="0" u="none" strike="noStrike" kern="0" cap="none" spc="0" normalizeH="0" baseline="0" noProof="0" dirty="0" smtClean="0">
+              <a:r>
+                <a:rPr kumimoji="0" lang="en-US" altLang="ja-JP" sz="800" b="0" i="0" u="none" strike="noStrike" kern="0" cap="none" spc="0" normalizeH="0" baseline="0" noProof="0" dirty="0" smtClean="0">
+                  <a:ln>
+                    <a:noFill/>
+                  </a:ln>
+                  <a:solidFill>
+                    <a:prstClr val="black"/>
+                  </a:solidFill>
+                  <a:effectLst/>
+                  <a:uLnTx/>
+                  <a:uFillTx/>
+                  <a:latin typeface="Arial" pitchFamily="34" charset="0"/>
+                  <a:ea typeface="HG明朝E" panose="02020909000000000000" pitchFamily="17" charset="-128"/>
+                  <a:cs typeface="Arial" pitchFamily="34" charset="0"/>
+                </a:rPr>
+                <a:t>Bindings</a:t>
+              </a:r>
+              <a:endParaRPr kumimoji="0" lang="ja-JP" altLang="en-US" sz="800" b="0" i="0" u="none" strike="noStrike" kern="0" cap="none" spc="0" normalizeH="0" baseline="0" noProof="0" dirty="0" smtClean="0">
                 <a:ln>
                   <a:noFill/>
                 </a:ln>
@@ -4652,8 +4947,8 @@
           </p:nvSpPr>
           <p:spPr bwMode="auto">
             <a:xfrm>
-              <a:off x="2912999" y="4688348"/>
-              <a:ext cx="1668143" cy="215195"/>
+              <a:off x="2912999" y="4595156"/>
+              <a:ext cx="1668143" cy="285438"/>
             </a:xfrm>
             <a:prstGeom prst="roundRect">
               <a:avLst/>
@@ -4699,7 +4994,7 @@
                 <a:defRPr/>
               </a:pPr>
               <a:r>
-                <a:rPr kumimoji="0" lang="en-US" altLang="ja-JP" sz="600" b="0" i="0" u="none" strike="noStrike" kern="0" cap="none" spc="0" normalizeH="0" baseline="0" noProof="0" dirty="0" smtClean="0">
+                <a:rPr kumimoji="0" lang="en-US" altLang="ja-JP" sz="800" b="0" i="0" u="none" strike="noStrike" kern="0" cap="none" spc="0" normalizeH="0" baseline="0" noProof="0" dirty="0" smtClean="0">
                   <a:ln>
                     <a:noFill/>
                   </a:ln>
@@ -4716,7 +5011,7 @@
                 <a:t>Resource</a:t>
               </a:r>
               <a:r>
-                <a:rPr kumimoji="0" lang="ja-JP" altLang="en-US" sz="600" b="0" i="0" u="none" strike="noStrike" kern="0" cap="none" spc="0" normalizeH="0" baseline="0" noProof="0" smtClean="0">
+                <a:rPr kumimoji="0" lang="ja-JP" altLang="en-US" sz="800" b="0" i="0" u="none" strike="noStrike" kern="0" cap="none" spc="0" normalizeH="0" baseline="0" noProof="0" smtClean="0">
                   <a:ln>
                     <a:noFill/>
                   </a:ln>
@@ -4733,7 +5028,7 @@
                 <a:t> </a:t>
               </a:r>
               <a:r>
-                <a:rPr kumimoji="0" lang="en-US" altLang="ja-JP" sz="600" b="0" i="0" u="none" strike="noStrike" kern="0" cap="none" spc="0" normalizeH="0" baseline="0" noProof="0" dirty="0" smtClean="0">
+                <a:rPr kumimoji="0" lang="en-US" altLang="ja-JP" sz="800" b="0" i="0" u="none" strike="noStrike" kern="0" cap="none" spc="0" normalizeH="0" baseline="0" noProof="0" dirty="0" smtClean="0">
                   <a:ln>
                     <a:noFill/>
                   </a:ln>
@@ -4749,7 +5044,7 @@
                 </a:rPr>
                 <a:t>Model</a:t>
               </a:r>
-              <a:endParaRPr kumimoji="0" lang="ja-JP" altLang="en-US" sz="600" b="0" i="0" u="none" strike="noStrike" kern="0" cap="none" spc="0" normalizeH="0" baseline="0" noProof="0" dirty="0" smtClean="0">
+              <a:endParaRPr kumimoji="0" lang="ja-JP" altLang="en-US" sz="800" b="0" i="0" u="none" strike="noStrike" kern="0" cap="none" spc="0" normalizeH="0" baseline="0" noProof="0" dirty="0" smtClean="0">
                 <a:ln>
                   <a:noFill/>
                 </a:ln>
@@ -4774,8 +5069,8 @@
           </p:nvSpPr>
           <p:spPr bwMode="auto">
             <a:xfrm>
-              <a:off x="2912999" y="4059961"/>
-              <a:ext cx="1668143" cy="210107"/>
+              <a:off x="2912999" y="4054908"/>
+              <a:ext cx="1668143" cy="500211"/>
             </a:xfrm>
             <a:prstGeom prst="verticalScroll">
               <a:avLst/>
@@ -4823,7 +5118,7 @@
                 <a:defRPr/>
               </a:pPr>
               <a:r>
-                <a:rPr kumimoji="0" lang="en-US" altLang="ja-JP" sz="600" b="0" i="0" u="none" strike="noStrike" kern="0" cap="none" spc="0" normalizeH="0" baseline="0" noProof="0" dirty="0" smtClean="0">
+                <a:rPr kumimoji="0" lang="en-US" altLang="ja-JP" sz="800" b="0" i="0" u="none" strike="noStrike" kern="0" cap="none" spc="0" normalizeH="0" baseline="0" noProof="0" dirty="0" smtClean="0">
                   <a:ln>
                     <a:noFill/>
                   </a:ln>
@@ -4837,9 +5132,69 @@
                   <a:ea typeface="HG明朝E" panose="02020909000000000000" pitchFamily="17" charset="-128"/>
                   <a:cs typeface="Arial" pitchFamily="34" charset="0"/>
                 </a:rPr>
-                <a:t>App Script</a:t>
+                <a:t>App </a:t>
               </a:r>
-              <a:endParaRPr kumimoji="0" lang="ja-JP" altLang="en-US" sz="600" b="0" i="0" u="none" strike="noStrike" kern="0" cap="none" spc="0" normalizeH="0" baseline="0" noProof="0" dirty="0" smtClean="0">
+              <a:r>
+                <a:rPr kumimoji="0" lang="en-US" altLang="ja-JP" sz="800" b="0" i="0" u="none" strike="noStrike" kern="0" cap="none" spc="0" normalizeH="0" baseline="0" noProof="0" dirty="0" smtClean="0">
+                  <a:ln>
+                    <a:noFill/>
+                  </a:ln>
+                  <a:solidFill>
+                    <a:prstClr val="white"/>
+                  </a:solidFill>
+                  <a:effectLst/>
+                  <a:uLnTx/>
+                  <a:uFillTx/>
+                  <a:latin typeface="Arial" pitchFamily="34" charset="0"/>
+                  <a:ea typeface="HG明朝E" panose="02020909000000000000" pitchFamily="17" charset="-128"/>
+                  <a:cs typeface="Arial" pitchFamily="34" charset="0"/>
+                </a:rPr>
+                <a:t>Script</a:t>
+              </a:r>
+              <a:r>
+                <a:rPr lang="en-US" altLang="ja-JP" sz="800" kern="0" dirty="0" smtClean="0">
+                  <a:solidFill>
+                    <a:prstClr val="white"/>
+                  </a:solidFill>
+                  <a:latin typeface="Arial" pitchFamily="34" charset="0"/>
+                  <a:ea typeface="HG明朝E" panose="02020909000000000000" pitchFamily="17" charset="-128"/>
+                  <a:cs typeface="Arial" pitchFamily="34" charset="0"/>
+                </a:rPr>
+                <a:t> </a:t>
+              </a:r>
+              <a:r>
+                <a:rPr lang="en-US" altLang="ja-JP" sz="800" kern="0" dirty="0" smtClean="0">
+                  <a:solidFill>
+                    <a:prstClr val="white"/>
+                  </a:solidFill>
+                  <a:latin typeface="Arial" pitchFamily="34" charset="0"/>
+                  <a:ea typeface="HG明朝E" panose="02020909000000000000" pitchFamily="17" charset="-128"/>
+                  <a:cs typeface="Arial" pitchFamily="34" charset="0"/>
+                </a:rPr>
+                <a:t>with</a:t>
+              </a:r>
+              <a:br>
+                <a:rPr lang="en-US" altLang="ja-JP" sz="800" kern="0" dirty="0" smtClean="0">
+                  <a:solidFill>
+                    <a:prstClr val="white"/>
+                  </a:solidFill>
+                  <a:latin typeface="Arial" pitchFamily="34" charset="0"/>
+                  <a:ea typeface="HG明朝E" panose="02020909000000000000" pitchFamily="17" charset="-128"/>
+                  <a:cs typeface="Arial" pitchFamily="34" charset="0"/>
+                </a:rPr>
+              </a:br>
+              <a:r>
+                <a:rPr lang="en-US" altLang="ja-JP" sz="800" kern="0" dirty="0" smtClean="0">
+                  <a:solidFill>
+                    <a:prstClr val="white"/>
+                  </a:solidFill>
+                  <a:latin typeface="Arial" pitchFamily="34" charset="0"/>
+                  <a:ea typeface="HG明朝E" panose="02020909000000000000" pitchFamily="17" charset="-128"/>
+                  <a:cs typeface="Arial" pitchFamily="34" charset="0"/>
+                </a:rPr>
+                <a:t>Software Objects</a:t>
+              </a:r>
+              <a:endParaRPr kumimoji="0" lang="ja-JP" altLang="en-US" sz="800" b="0" i="0" u="none" strike="noStrike" kern="0" cap="none" spc="0" normalizeH="0" baseline="0" noProof="0" dirty="0" smtClean="0">
                 <a:ln>
                   <a:noFill/>
                 </a:ln>
@@ -4856,134 +5211,6 @@
             </a:p>
           </p:txBody>
         </p:sp>
-        <p:sp>
-          <p:nvSpPr>
-            <p:cNvPr id="123" name="角丸四角形 21"/>
-            <p:cNvSpPr/>
-            <p:nvPr/>
-          </p:nvSpPr>
-          <p:spPr bwMode="auto">
-            <a:xfrm>
-              <a:off x="2912999" y="4396227"/>
-              <a:ext cx="1668143" cy="253545"/>
-            </a:xfrm>
-            <a:prstGeom prst="roundRect">
-              <a:avLst/>
-            </a:prstGeom>
-            <a:solidFill>
-              <a:srgbClr val="7030A0"/>
-            </a:solidFill>
-            <a:ln w="25400" cap="flat" cmpd="sng" algn="ctr">
-              <a:solidFill>
-                <a:schemeClr val="accent4">
-                  <a:lumMod val="50000"/>
-                </a:schemeClr>
-              </a:solidFill>
-              <a:prstDash val="solid"/>
-              <a:round/>
-              <a:headEnd type="none" w="med" len="med"/>
-              <a:tailEnd type="none" w="med" len="med"/>
-            </a:ln>
-            <a:effectLst/>
-            <a:extLst/>
-          </p:spPr>
-          <p:txBody>
-            <a:bodyPr vert="horz" wrap="square" lIns="91440" tIns="45720" rIns="91440" bIns="45720" numCol="1" rtlCol="0" anchor="ctr" anchorCtr="0" compatLnSpc="1">
-              <a:prstTxWarp prst="textNoShape">
-                <a:avLst/>
-              </a:prstTxWarp>
-            </a:bodyPr>
-            <a:lstStyle/>
-            <a:p>
-              <a:pPr algn="ctr" fontAlgn="ctr"/>
-              <a:r>
-                <a:rPr lang="en-US" altLang="ja-JP" sz="600" dirty="0" smtClean="0">
-                  <a:solidFill>
-                    <a:schemeClr val="bg1"/>
-                  </a:solidFill>
-                  <a:latin typeface="Arial" pitchFamily="34" charset="0"/>
-                  <a:ea typeface="HG明朝E" panose="02020909000000000000" pitchFamily="17" charset="-128"/>
-                  <a:cs typeface="Arial" pitchFamily="34" charset="0"/>
-                </a:rPr>
-                <a:t>Runtime Environment</a:t>
-              </a:r>
-              <a:endParaRPr lang="ja-JP" altLang="en-US" sz="600" dirty="0" smtClean="0">
-                <a:solidFill>
-                  <a:schemeClr val="bg1"/>
-                </a:solidFill>
-                <a:latin typeface="Arial" pitchFamily="34" charset="0"/>
-                <a:ea typeface="HG明朝E" panose="02020909000000000000" pitchFamily="17" charset="-128"/>
-                <a:cs typeface="Arial" pitchFamily="34" charset="0"/>
-              </a:endParaRPr>
-            </a:p>
-          </p:txBody>
-        </p:sp>
-        <p:cxnSp>
-          <p:nvCxnSpPr>
-            <p:cNvPr id="124" name="直線矢印コネクタ 72"/>
-            <p:cNvCxnSpPr/>
-            <p:nvPr/>
-          </p:nvCxnSpPr>
-          <p:spPr bwMode="auto">
-            <a:xfrm>
-              <a:off x="4182163" y="4209096"/>
-              <a:ext cx="0" cy="217391"/>
-            </a:xfrm>
-            <a:prstGeom prst="straightConnector1">
-              <a:avLst/>
-            </a:prstGeom>
-            <a:noFill/>
-            <a:ln w="19050" cap="flat" cmpd="sng" algn="ctr">
-              <a:solidFill>
-                <a:sysClr val="windowText" lastClr="000000"/>
-              </a:solidFill>
-              <a:prstDash val="solid"/>
-              <a:headEnd type="triangle" w="med" len="sm"/>
-              <a:tailEnd type="triangle" w="med" len="sm"/>
-            </a:ln>
-            <a:effectLst>
-              <a:outerShdw blurRad="38100" dist="25400" dir="5400000" rotWithShape="0">
-                <a:srgbClr val="000000">
-                  <a:alpha val="40000"/>
-                </a:srgbClr>
-              </a:outerShdw>
-            </a:effectLst>
-            <a:extLst/>
-          </p:spPr>
-        </p:cxnSp>
-        <p:cxnSp>
-          <p:nvCxnSpPr>
-            <p:cNvPr id="125" name="直線矢印コネクタ 75"/>
-            <p:cNvCxnSpPr/>
-            <p:nvPr/>
-          </p:nvCxnSpPr>
-          <p:spPr bwMode="auto">
-            <a:xfrm>
-              <a:off x="3318068" y="4209096"/>
-              <a:ext cx="0" cy="217391"/>
-            </a:xfrm>
-            <a:prstGeom prst="straightConnector1">
-              <a:avLst/>
-            </a:prstGeom>
-            <a:noFill/>
-            <a:ln w="19050" cap="flat" cmpd="sng" algn="ctr">
-              <a:solidFill>
-                <a:sysClr val="windowText" lastClr="000000"/>
-              </a:solidFill>
-              <a:prstDash val="solid"/>
-              <a:headEnd type="triangle" w="med" len="sm"/>
-              <a:tailEnd type="triangle" w="med" len="sm"/>
-            </a:ln>
-            <a:effectLst>
-              <a:outerShdw blurRad="38100" dist="25400" dir="5400000" rotWithShape="0">
-                <a:srgbClr val="000000">
-                  <a:alpha val="40000"/>
-                </a:srgbClr>
-              </a:outerShdw>
-            </a:effectLst>
-            <a:extLst/>
-          </p:spPr>
-        </p:cxnSp>
       </p:grpSp>
       <p:sp>
         <p:nvSpPr>
@@ -5334,7 +5561,7 @@
         <p:spPr>
           <a:xfrm>
             <a:off x="1301372" y="1416840"/>
-            <a:ext cx="3414644" cy="369332"/>
+            <a:ext cx="3414644" cy="338554"/>
           </a:xfrm>
           <a:prstGeom prst="rect">
             <a:avLst/>
@@ -5349,26 +5576,26 @@
           <a:p>
             <a:pPr algn="ctr"/>
             <a:r>
-              <a:rPr lang="de-DE" dirty="0" err="1" smtClean="0"/>
+              <a:rPr lang="de-DE" sz="1600" dirty="0" err="1" smtClean="0"/>
               <a:t>Cloud</a:t>
             </a:r>
             <a:r>
-              <a:rPr lang="de-DE" dirty="0" smtClean="0"/>
+              <a:rPr lang="de-DE" sz="1600" dirty="0" smtClean="0"/>
               <a:t> </a:t>
             </a:r>
             <a:r>
-              <a:rPr lang="de-DE" dirty="0" err="1" smtClean="0"/>
+              <a:rPr lang="de-DE" sz="1600" dirty="0" err="1" smtClean="0"/>
               <a:t>Mirror</a:t>
             </a:r>
             <a:r>
-              <a:rPr lang="de-DE" dirty="0" smtClean="0"/>
+              <a:rPr lang="de-DE" sz="1600" dirty="0" smtClean="0"/>
               <a:t> / Device </a:t>
             </a:r>
             <a:r>
-              <a:rPr lang="de-DE" dirty="0" err="1" smtClean="0"/>
+              <a:rPr lang="de-DE" sz="1600" dirty="0" err="1" smtClean="0"/>
               <a:t>Shadow</a:t>
             </a:r>
-            <a:endParaRPr lang="de-DE" dirty="0"/>
+            <a:endParaRPr lang="de-DE" sz="1600" dirty="0"/>
           </a:p>
         </p:txBody>
       </p:sp>
@@ -5380,8 +5607,8 @@
         </p:nvSpPr>
         <p:spPr>
           <a:xfrm>
-            <a:off x="5364088" y="1403484"/>
-            <a:ext cx="1747786" cy="369332"/>
+            <a:off x="5452381" y="1403484"/>
+            <a:ext cx="1571199" cy="338554"/>
           </a:xfrm>
           <a:prstGeom prst="rect">
             <a:avLst/>
@@ -5396,10 +5623,10 @@
           <a:p>
             <a:pPr algn="ctr"/>
             <a:r>
-              <a:rPr lang="de-DE" dirty="0" smtClean="0"/>
+              <a:rPr lang="de-DE" sz="1600" dirty="0" smtClean="0"/>
               <a:t>Integration Hubs</a:t>
             </a:r>
-            <a:endParaRPr lang="de-DE" dirty="0"/>
+            <a:endParaRPr lang="de-DE" sz="1600" dirty="0"/>
           </a:p>
         </p:txBody>
       </p:sp>
@@ -5411,8 +5638,8 @@
         </p:nvSpPr>
         <p:spPr>
           <a:xfrm>
-            <a:off x="5364088" y="5473864"/>
-            <a:ext cx="2635273" cy="369332"/>
+            <a:off x="5464671" y="5473864"/>
+            <a:ext cx="2356030" cy="338554"/>
           </a:xfrm>
           <a:prstGeom prst="rect">
             <a:avLst/>
@@ -5427,18 +5654,18 @@
           <a:p>
             <a:pPr algn="ctr"/>
             <a:r>
-              <a:rPr lang="de-DE" dirty="0" smtClean="0"/>
+              <a:rPr lang="de-DE" sz="1600" dirty="0" smtClean="0"/>
               <a:t>Thing-</a:t>
             </a:r>
             <a:r>
-              <a:rPr lang="de-DE" dirty="0" err="1" smtClean="0"/>
+              <a:rPr lang="de-DE" sz="1600" dirty="0" err="1" smtClean="0"/>
               <a:t>to</a:t>
             </a:r>
             <a:r>
-              <a:rPr lang="de-DE" dirty="0" smtClean="0"/>
+              <a:rPr lang="de-DE" sz="1600" dirty="0" smtClean="0"/>
               <a:t>-Thing Interaction</a:t>
             </a:r>
-            <a:endParaRPr lang="de-DE" dirty="0"/>
+            <a:endParaRPr lang="de-DE" sz="1600" dirty="0"/>
           </a:p>
         </p:txBody>
       </p:sp>
@@ -5451,7 +5678,7 @@
         <p:spPr>
           <a:xfrm>
             <a:off x="994582" y="3573016"/>
-            <a:ext cx="1705210" cy="369332"/>
+            <a:ext cx="1534266" cy="338554"/>
           </a:xfrm>
           <a:prstGeom prst="rect">
             <a:avLst/>
@@ -5465,10 +5692,10 @@
           <a:lstStyle/>
           <a:p>
             <a:r>
-              <a:rPr lang="de-DE" dirty="0" smtClean="0"/>
+              <a:rPr lang="de-DE" sz="1600" dirty="0" smtClean="0"/>
               <a:t>Web Integration</a:t>
             </a:r>
-            <a:endParaRPr lang="de-DE" dirty="0"/>
+            <a:endParaRPr lang="de-DE" sz="1600" dirty="0"/>
           </a:p>
         </p:txBody>
       </p:sp>
@@ -5567,7 +5794,7 @@
         <p:spPr>
           <a:xfrm>
             <a:off x="4211960" y="3358733"/>
-            <a:ext cx="1089203" cy="646331"/>
+            <a:ext cx="1089203" cy="584775"/>
           </a:xfrm>
           <a:prstGeom prst="rect">
             <a:avLst/>
@@ -5582,14 +5809,14 @@
           <a:p>
             <a:pPr algn="ctr"/>
             <a:r>
-              <a:rPr lang="de-DE" dirty="0" err="1" smtClean="0"/>
+              <a:rPr lang="de-DE" sz="1600" dirty="0" err="1" smtClean="0"/>
               <a:t>Semantic</a:t>
             </a:r>
             <a:r>
-              <a:rPr lang="de-DE" dirty="0" smtClean="0"/>
+              <a:rPr lang="de-DE" sz="1600" dirty="0" smtClean="0"/>
               <a:t> Models</a:t>
             </a:r>
-            <a:endParaRPr lang="de-DE" dirty="0"/>
+            <a:endParaRPr lang="de-DE" sz="1600" dirty="0"/>
           </a:p>
         </p:txBody>
       </p:sp>
@@ -5602,7 +5829,7 @@
         <p:spPr>
           <a:xfrm>
             <a:off x="7139905" y="3068960"/>
-            <a:ext cx="1497309" cy="923330"/>
+            <a:ext cx="1608559" cy="830997"/>
           </a:xfrm>
           <a:prstGeom prst="rect">
             <a:avLst/>
@@ -5616,35 +5843,44 @@
           <a:lstStyle/>
           <a:p>
             <a:r>
-              <a:rPr lang="de-DE" dirty="0" err="1" smtClean="0"/>
+              <a:rPr lang="de-DE" sz="1600" dirty="0" err="1" smtClean="0"/>
               <a:t>Standardized</a:t>
             </a:r>
             <a:r>
-              <a:rPr lang="de-DE" dirty="0" smtClean="0"/>
+              <a:rPr lang="de-DE" sz="1600" dirty="0" smtClean="0"/>
               <a:t/>
             </a:r>
             <a:br>
-              <a:rPr lang="de-DE" dirty="0" smtClean="0"/>
+              <a:rPr lang="de-DE" sz="1600" dirty="0" smtClean="0"/>
             </a:br>
             <a:r>
-              <a:rPr lang="de-DE" dirty="0" smtClean="0"/>
-              <a:t>Scripting APIs</a:t>
-            </a:r>
-          </a:p>
-          <a:p>
-            <a:r>
-              <a:rPr lang="de-DE" dirty="0" err="1" smtClean="0"/>
+              <a:rPr lang="de-DE" sz="1600" dirty="0" smtClean="0"/>
+              <a:t>Scripting </a:t>
+            </a:r>
+            <a:r>
+              <a:rPr lang="de-DE" sz="1600" dirty="0" smtClean="0"/>
+              <a:t>APIs </a:t>
+            </a:r>
+            <a:r>
+              <a:rPr lang="de-DE" sz="1600" dirty="0" err="1" smtClean="0"/>
               <a:t>for</a:t>
             </a:r>
             <a:r>
-              <a:rPr lang="de-DE" dirty="0" smtClean="0"/>
-              <a:t> </a:t>
-            </a:r>
-            <a:r>
-              <a:rPr lang="de-DE" dirty="0" err="1" smtClean="0"/>
+              <a:rPr lang="de-DE" sz="1600" dirty="0" smtClean="0"/>
+              <a:t/>
+            </a:r>
+            <a:br>
+              <a:rPr lang="de-DE" sz="1600" dirty="0" smtClean="0"/>
+            </a:br>
+            <a:r>
+              <a:rPr lang="de-DE" sz="1600" dirty="0" smtClean="0"/>
+              <a:t>portable </a:t>
+            </a:r>
+            <a:r>
+              <a:rPr lang="de-DE" sz="1600" dirty="0" err="1" smtClean="0"/>
               <a:t>Apps</a:t>
             </a:r>
-            <a:endParaRPr lang="de-DE" dirty="0"/>
+            <a:endParaRPr lang="de-DE" sz="1600" dirty="0"/>
           </a:p>
         </p:txBody>
       </p:sp>
@@ -5701,19 +5937,17 @@
           </a:prstGeom>
         </p:spPr>
         <p:style>
-          <a:lnRef idx="2">
-            <a:schemeClr val="accent1">
-              <a:shade val="50000"/>
-            </a:schemeClr>
+          <a:lnRef idx="1">
+            <a:schemeClr val="dk1"/>
           </a:lnRef>
-          <a:fillRef idx="1">
-            <a:schemeClr val="accent1"/>
+          <a:fillRef idx="2">
+            <a:schemeClr val="dk1"/>
           </a:fillRef>
-          <a:effectRef idx="0">
-            <a:schemeClr val="accent1"/>
+          <a:effectRef idx="1">
+            <a:schemeClr val="dk1"/>
           </a:effectRef>
           <a:fontRef idx="minor">
-            <a:schemeClr val="lt1"/>
+            <a:schemeClr val="dk1"/>
           </a:fontRef>
         </p:style>
         <p:txBody>
@@ -5762,599 +5996,6 @@
           </a:fontRef>
         </p:style>
       </p:cxnSp>
-      <p:grpSp>
-        <p:nvGrpSpPr>
-          <p:cNvPr id="176" name="Gruppieren 175"/>
-          <p:cNvGrpSpPr/>
-          <p:nvPr/>
-        </p:nvGrpSpPr>
-        <p:grpSpPr>
-          <a:xfrm>
-            <a:off x="6512051" y="4398259"/>
-            <a:ext cx="1190046" cy="1025651"/>
-            <a:chOff x="2828012" y="3702859"/>
-            <a:chExt cx="1838118" cy="1584197"/>
-          </a:xfrm>
-        </p:grpSpPr>
-        <p:sp>
-          <p:nvSpPr>
-            <p:cNvPr id="177" name="角丸四角形 6"/>
-            <p:cNvSpPr/>
-            <p:nvPr/>
-          </p:nvSpPr>
-          <p:spPr bwMode="auto">
-            <a:xfrm>
-              <a:off x="2828012" y="3702859"/>
-              <a:ext cx="1838118" cy="1584197"/>
-            </a:xfrm>
-            <a:prstGeom prst="roundRect">
-              <a:avLst>
-                <a:gd name="adj" fmla="val 6113"/>
-              </a:avLst>
-            </a:prstGeom>
-            <a:gradFill rotWithShape="1">
-              <a:gsLst>
-                <a:gs pos="0">
-                  <a:sysClr val="windowText" lastClr="000000">
-                    <a:tint val="45000"/>
-                    <a:satMod val="200000"/>
-                  </a:sysClr>
-                </a:gs>
-                <a:gs pos="30000">
-                  <a:sysClr val="windowText" lastClr="000000">
-                    <a:tint val="61000"/>
-                    <a:satMod val="200000"/>
-                  </a:sysClr>
-                </a:gs>
-                <a:gs pos="45000">
-                  <a:sysClr val="windowText" lastClr="000000">
-                    <a:tint val="66000"/>
-                    <a:satMod val="200000"/>
-                  </a:sysClr>
-                </a:gs>
-                <a:gs pos="55000">
-                  <a:sysClr val="windowText" lastClr="000000">
-                    <a:tint val="66000"/>
-                    <a:satMod val="200000"/>
-                  </a:sysClr>
-                </a:gs>
-                <a:gs pos="73000">
-                  <a:sysClr val="windowText" lastClr="000000">
-                    <a:tint val="61000"/>
-                    <a:satMod val="200000"/>
-                  </a:sysClr>
-                </a:gs>
-                <a:gs pos="100000">
-                  <a:sysClr val="windowText" lastClr="000000">
-                    <a:tint val="45000"/>
-                    <a:satMod val="200000"/>
-                  </a:sysClr>
-                </a:gs>
-              </a:gsLst>
-              <a:lin ang="950000" scaled="1"/>
-            </a:gradFill>
-            <a:ln w="9525" cap="flat" cmpd="sng" algn="ctr">
-              <a:solidFill>
-                <a:sysClr val="windowText" lastClr="000000"/>
-              </a:solidFill>
-              <a:prstDash val="solid"/>
-              <a:headEnd type="none" w="med" len="med"/>
-              <a:tailEnd type="none" w="med" len="med"/>
-            </a:ln>
-            <a:effectLst>
-              <a:outerShdw blurRad="38100" dist="25400" dir="5400000" rotWithShape="0">
-                <a:srgbClr val="000000">
-                  <a:alpha val="40000"/>
-                </a:srgbClr>
-              </a:outerShdw>
-            </a:effectLst>
-            <a:extLst/>
-          </p:spPr>
-          <p:txBody>
-            <a:bodyPr vert="horz" wrap="none" lIns="91440" tIns="36000" rIns="91440" bIns="36000" numCol="1" rtlCol="0" anchor="t" anchorCtr="0" compatLnSpc="1">
-              <a:prstTxWarp prst="textNoShape">
-                <a:avLst/>
-              </a:prstTxWarp>
-            </a:bodyPr>
-            <a:lstStyle/>
-            <a:p>
-              <a:pPr marL="0" marR="0" lvl="0" indent="0" algn="ctr" defTabSz="914400" eaLnBrk="1" fontAlgn="ctr" latinLnBrk="0" hangingPunct="1">
-                <a:lnSpc>
-                  <a:spcPct val="100000"/>
-                </a:lnSpc>
-                <a:spcBef>
-                  <a:spcPts val="0"/>
-                </a:spcBef>
-                <a:spcAft>
-                  <a:spcPts val="0"/>
-                </a:spcAft>
-                <a:buClrTx/>
-                <a:buSzTx/>
-                <a:buFontTx/>
-                <a:buNone/>
-                <a:tabLst/>
-                <a:defRPr/>
-              </a:pPr>
-              <a:r>
-                <a:rPr kumimoji="0" lang="en-US" altLang="ja-JP" sz="1000" b="0" i="0" u="none" strike="noStrike" kern="0" cap="none" spc="0" normalizeH="0" baseline="0" noProof="0" dirty="0" err="1" smtClean="0">
-                  <a:ln>
-                    <a:noFill/>
-                  </a:ln>
-                  <a:solidFill>
-                    <a:srgbClr val="000000"/>
-                  </a:solidFill>
-                  <a:effectLst/>
-                  <a:uLnTx/>
-                  <a:uFillTx/>
-                  <a:latin typeface="Arial" pitchFamily="34" charset="0"/>
-                  <a:ea typeface="HG明朝E" panose="02020909000000000000" pitchFamily="17" charset="-128"/>
-                  <a:cs typeface="Arial" pitchFamily="34" charset="0"/>
-                </a:rPr>
-                <a:t>WoT</a:t>
-              </a:r>
-              <a:r>
-                <a:rPr kumimoji="0" lang="en-US" altLang="ja-JP" sz="1000" b="0" i="0" u="none" strike="noStrike" kern="0" cap="none" spc="0" normalizeH="0" baseline="0" noProof="0" dirty="0" smtClean="0">
-                  <a:ln>
-                    <a:noFill/>
-                  </a:ln>
-                  <a:solidFill>
-                    <a:srgbClr val="000000"/>
-                  </a:solidFill>
-                  <a:effectLst/>
-                  <a:uLnTx/>
-                  <a:uFillTx/>
-                  <a:latin typeface="Arial" pitchFamily="34" charset="0"/>
-                  <a:ea typeface="HG明朝E" panose="02020909000000000000" pitchFamily="17" charset="-128"/>
-                  <a:cs typeface="Arial" pitchFamily="34" charset="0"/>
-                </a:rPr>
-                <a:t> Servient</a:t>
-              </a:r>
-              <a:endParaRPr kumimoji="0" lang="ja-JP" altLang="en-US" sz="1000" b="0" i="0" u="none" strike="noStrike" kern="0" cap="none" spc="0" normalizeH="0" baseline="0" noProof="0" dirty="0" smtClean="0">
-                <a:ln>
-                  <a:noFill/>
-                </a:ln>
-                <a:solidFill>
-                  <a:srgbClr val="000000"/>
-                </a:solidFill>
-                <a:effectLst/>
-                <a:uLnTx/>
-                <a:uFillTx/>
-                <a:latin typeface="Arial" pitchFamily="34" charset="0"/>
-                <a:ea typeface="HG明朝E" panose="02020909000000000000" pitchFamily="17" charset="-128"/>
-                <a:cs typeface="Arial" pitchFamily="34" charset="0"/>
-              </a:endParaRPr>
-            </a:p>
-          </p:txBody>
-        </p:sp>
-        <p:sp>
-          <p:nvSpPr>
-            <p:cNvPr id="178" name="角丸四角形 24"/>
-            <p:cNvSpPr/>
-            <p:nvPr/>
-          </p:nvSpPr>
-          <p:spPr bwMode="auto">
-            <a:xfrm>
-              <a:off x="2912999" y="4942119"/>
-              <a:ext cx="1668143" cy="246334"/>
-            </a:xfrm>
-            <a:prstGeom prst="roundRect">
-              <a:avLst/>
-            </a:prstGeom>
-            <a:solidFill>
-              <a:srgbClr val="92D050"/>
-            </a:solidFill>
-            <a:ln w="25400" cap="flat" cmpd="sng" algn="ctr">
-              <a:solidFill>
-                <a:srgbClr val="1BA12B"/>
-              </a:solidFill>
-              <a:prstDash val="solid"/>
-              <a:round/>
-              <a:headEnd type="none" w="med" len="med"/>
-              <a:tailEnd type="none" w="med" len="med"/>
-            </a:ln>
-            <a:effectLst/>
-            <a:extLst/>
-          </p:spPr>
-          <p:txBody>
-            <a:bodyPr vert="horz" wrap="square" lIns="91440" tIns="45720" rIns="91440" bIns="45720" numCol="1" rtlCol="0" anchor="ctr" anchorCtr="0" compatLnSpc="1">
-              <a:prstTxWarp prst="textNoShape">
-                <a:avLst/>
-              </a:prstTxWarp>
-            </a:bodyPr>
-            <a:lstStyle/>
-            <a:p>
-              <a:pPr marL="0" marR="0" lvl="0" indent="0" algn="ctr" defTabSz="914400" eaLnBrk="1" fontAlgn="ctr" latinLnBrk="0" hangingPunct="1">
-                <a:lnSpc>
-                  <a:spcPct val="100000"/>
-                </a:lnSpc>
-                <a:spcBef>
-                  <a:spcPts val="0"/>
-                </a:spcBef>
-                <a:spcAft>
-                  <a:spcPts val="0"/>
-                </a:spcAft>
-                <a:buClrTx/>
-                <a:buSzTx/>
-                <a:buFontTx/>
-                <a:buNone/>
-                <a:tabLst/>
-                <a:defRPr/>
-              </a:pPr>
-              <a:r>
-                <a:rPr kumimoji="0" lang="en-US" altLang="ja-JP" sz="600" b="0" i="0" u="none" strike="noStrike" kern="0" cap="none" spc="0" normalizeH="0" baseline="0" noProof="0" dirty="0" smtClean="0">
-                  <a:ln>
-                    <a:noFill/>
-                  </a:ln>
-                  <a:solidFill>
-                    <a:prstClr val="black"/>
-                  </a:solidFill>
-                  <a:effectLst/>
-                  <a:uLnTx/>
-                  <a:uFillTx/>
-                  <a:latin typeface="Arial" pitchFamily="34" charset="0"/>
-                  <a:ea typeface="HG明朝E" panose="02020909000000000000" pitchFamily="17" charset="-128"/>
-                  <a:cs typeface="Arial" pitchFamily="34" charset="0"/>
-                </a:rPr>
-                <a:t>Protocol Bindings</a:t>
-              </a:r>
-              <a:endParaRPr kumimoji="0" lang="ja-JP" altLang="en-US" sz="600" b="0" i="0" u="none" strike="noStrike" kern="0" cap="none" spc="0" normalizeH="0" baseline="0" noProof="0" dirty="0" smtClean="0">
-                <a:ln>
-                  <a:noFill/>
-                </a:ln>
-                <a:solidFill>
-                  <a:prstClr val="black"/>
-                </a:solidFill>
-                <a:effectLst/>
-                <a:uLnTx/>
-                <a:uFillTx/>
-                <a:latin typeface="Arial" pitchFamily="34" charset="0"/>
-                <a:ea typeface="HG明朝E" panose="02020909000000000000" pitchFamily="17" charset="-128"/>
-                <a:cs typeface="Arial" pitchFamily="34" charset="0"/>
-              </a:endParaRPr>
-            </a:p>
-          </p:txBody>
-        </p:sp>
-        <p:sp>
-          <p:nvSpPr>
-            <p:cNvPr id="180" name="角丸四角形 21"/>
-            <p:cNvSpPr/>
-            <p:nvPr/>
-          </p:nvSpPr>
-          <p:spPr bwMode="auto">
-            <a:xfrm>
-              <a:off x="2912999" y="4688348"/>
-              <a:ext cx="1668143" cy="215195"/>
-            </a:xfrm>
-            <a:prstGeom prst="roundRect">
-              <a:avLst/>
-            </a:prstGeom>
-            <a:solidFill>
-              <a:srgbClr val="0070C0"/>
-            </a:solidFill>
-            <a:ln w="25400" cap="flat" cmpd="sng" algn="ctr">
-              <a:solidFill>
-                <a:srgbClr val="0000FF"/>
-              </a:solidFill>
-              <a:prstDash val="solid"/>
-              <a:round/>
-              <a:headEnd type="none" w="med" len="med"/>
-              <a:tailEnd type="none" w="med" len="med"/>
-            </a:ln>
-            <a:effectLst/>
-            <a:extLst/>
-          </p:spPr>
-          <p:txBody>
-            <a:bodyPr vert="horz" wrap="square" lIns="91440" tIns="45720" rIns="91440" bIns="45720" numCol="1" rtlCol="0" anchor="ctr" anchorCtr="0" compatLnSpc="1">
-              <a:prstTxWarp prst="textNoShape">
-                <a:avLst/>
-              </a:prstTxWarp>
-            </a:bodyPr>
-            <a:lstStyle/>
-            <a:p>
-              <a:pPr marL="0" marR="0" lvl="0" indent="0" algn="ctr" defTabSz="914400" eaLnBrk="1" fontAlgn="ctr" latinLnBrk="0" hangingPunct="1">
-                <a:lnSpc>
-                  <a:spcPct val="100000"/>
-                </a:lnSpc>
-                <a:spcBef>
-                  <a:spcPts val="0"/>
-                </a:spcBef>
-                <a:spcAft>
-                  <a:spcPts val="0"/>
-                </a:spcAft>
-                <a:buClrTx/>
-                <a:buSzTx/>
-                <a:buFontTx/>
-                <a:buNone/>
-                <a:tabLst/>
-                <a:defRPr/>
-              </a:pPr>
-              <a:r>
-                <a:rPr kumimoji="0" lang="en-US" altLang="ja-JP" sz="600" b="0" i="0" u="none" strike="noStrike" kern="0" cap="none" spc="0" normalizeH="0" baseline="0" noProof="0" dirty="0" smtClean="0">
-                  <a:ln>
-                    <a:noFill/>
-                  </a:ln>
-                  <a:solidFill>
-                    <a:schemeClr val="bg1"/>
-                  </a:solidFill>
-                  <a:effectLst/>
-                  <a:uLnTx/>
-                  <a:uFillTx/>
-                  <a:latin typeface="Arial" pitchFamily="34" charset="0"/>
-                  <a:ea typeface="HG明朝E" panose="02020909000000000000" pitchFamily="17" charset="-128"/>
-                  <a:cs typeface="Arial" pitchFamily="34" charset="0"/>
-                </a:rPr>
-                <a:t>Resource</a:t>
-              </a:r>
-              <a:r>
-                <a:rPr kumimoji="0" lang="ja-JP" altLang="en-US" sz="600" b="0" i="0" u="none" strike="noStrike" kern="0" cap="none" spc="0" normalizeH="0" baseline="0" noProof="0" smtClean="0">
-                  <a:ln>
-                    <a:noFill/>
-                  </a:ln>
-                  <a:solidFill>
-                    <a:schemeClr val="bg1"/>
-                  </a:solidFill>
-                  <a:effectLst/>
-                  <a:uLnTx/>
-                  <a:uFillTx/>
-                  <a:latin typeface="Arial" pitchFamily="34" charset="0"/>
-                  <a:ea typeface="HG明朝E" panose="02020909000000000000" pitchFamily="17" charset="-128"/>
-                  <a:cs typeface="Arial" pitchFamily="34" charset="0"/>
-                </a:rPr>
-                <a:t> </a:t>
-              </a:r>
-              <a:r>
-                <a:rPr kumimoji="0" lang="en-US" altLang="ja-JP" sz="600" b="0" i="0" u="none" strike="noStrike" kern="0" cap="none" spc="0" normalizeH="0" baseline="0" noProof="0" dirty="0" smtClean="0">
-                  <a:ln>
-                    <a:noFill/>
-                  </a:ln>
-                  <a:solidFill>
-                    <a:schemeClr val="bg1"/>
-                  </a:solidFill>
-                  <a:effectLst/>
-                  <a:uLnTx/>
-                  <a:uFillTx/>
-                  <a:latin typeface="Arial" pitchFamily="34" charset="0"/>
-                  <a:ea typeface="HG明朝E" panose="02020909000000000000" pitchFamily="17" charset="-128"/>
-                  <a:cs typeface="Arial" pitchFamily="34" charset="0"/>
-                </a:rPr>
-                <a:t>Model</a:t>
-              </a:r>
-              <a:endParaRPr kumimoji="0" lang="ja-JP" altLang="en-US" sz="600" b="0" i="0" u="none" strike="noStrike" kern="0" cap="none" spc="0" normalizeH="0" baseline="0" noProof="0" dirty="0" smtClean="0">
-                <a:ln>
-                  <a:noFill/>
-                </a:ln>
-                <a:solidFill>
-                  <a:schemeClr val="bg1"/>
-                </a:solidFill>
-                <a:effectLst/>
-                <a:uLnTx/>
-                <a:uFillTx/>
-                <a:latin typeface="Arial" pitchFamily="34" charset="0"/>
-                <a:ea typeface="HG明朝E" panose="02020909000000000000" pitchFamily="17" charset="-128"/>
-                <a:cs typeface="Arial" pitchFamily="34" charset="0"/>
-              </a:endParaRPr>
-            </a:p>
-          </p:txBody>
-        </p:sp>
-        <p:sp>
-          <p:nvSpPr>
-            <p:cNvPr id="184" name="縦巻き 49"/>
-            <p:cNvSpPr/>
-            <p:nvPr/>
-          </p:nvSpPr>
-          <p:spPr bwMode="auto">
-            <a:xfrm>
-              <a:off x="2912999" y="4059961"/>
-              <a:ext cx="1668143" cy="210107"/>
-            </a:xfrm>
-            <a:prstGeom prst="verticalScroll">
-              <a:avLst/>
-            </a:prstGeom>
-            <a:solidFill>
-              <a:srgbClr val="7030A0"/>
-            </a:solidFill>
-            <a:ln w="9525" cap="flat" cmpd="sng" algn="ctr">
-              <a:solidFill>
-                <a:schemeClr val="accent4">
-                  <a:lumMod val="50000"/>
-                </a:schemeClr>
-              </a:solidFill>
-              <a:prstDash val="solid"/>
-              <a:round/>
-              <a:headEnd type="none" w="med" len="med"/>
-              <a:tailEnd type="none" w="med" len="med"/>
-            </a:ln>
-            <a:effectLst/>
-            <a:extLst/>
-          </p:spPr>
-          <p:txBody>
-            <a:bodyPr vert="horz" wrap="none" lIns="91440" tIns="45720" rIns="91440" bIns="45720" numCol="1" rtlCol="0" anchor="ctr" anchorCtr="0" compatLnSpc="1">
-              <a:prstTxWarp prst="textNoShape">
-                <a:avLst/>
-              </a:prstTxWarp>
-            </a:bodyPr>
-            <a:lstStyle/>
-            <a:p>
-              <a:pPr marL="0" marR="0" lvl="0" indent="0" algn="ctr" defTabSz="914400" eaLnBrk="1" fontAlgn="ctr" latinLnBrk="0" hangingPunct="1">
-                <a:lnSpc>
-                  <a:spcPct val="100000"/>
-                </a:lnSpc>
-                <a:spcBef>
-                  <a:spcPts val="0"/>
-                </a:spcBef>
-                <a:spcAft>
-                  <a:spcPts val="0"/>
-                </a:spcAft>
-                <a:buClrTx/>
-                <a:buSzTx/>
-                <a:buFontTx/>
-                <a:buNone/>
-                <a:tabLst/>
-                <a:defRPr/>
-              </a:pPr>
-              <a:r>
-                <a:rPr kumimoji="0" lang="en-US" altLang="ja-JP" sz="600" b="0" i="0" u="none" strike="noStrike" kern="0" cap="none" spc="0" normalizeH="0" baseline="0" noProof="0" dirty="0" smtClean="0">
-                  <a:ln>
-                    <a:noFill/>
-                  </a:ln>
-                  <a:solidFill>
-                    <a:prstClr val="white"/>
-                  </a:solidFill>
-                  <a:effectLst/>
-                  <a:uLnTx/>
-                  <a:uFillTx/>
-                  <a:latin typeface="Arial" pitchFamily="34" charset="0"/>
-                  <a:ea typeface="HG明朝E" panose="02020909000000000000" pitchFamily="17" charset="-128"/>
-                  <a:cs typeface="Arial" pitchFamily="34" charset="0"/>
-                </a:rPr>
-                <a:t>App Script</a:t>
-              </a:r>
-              <a:endParaRPr kumimoji="0" lang="ja-JP" altLang="en-US" sz="600" b="0" i="0" u="none" strike="noStrike" kern="0" cap="none" spc="0" normalizeH="0" baseline="0" noProof="0" dirty="0" smtClean="0">
-                <a:ln>
-                  <a:noFill/>
-                </a:ln>
-                <a:solidFill>
-                  <a:prstClr val="white"/>
-                </a:solidFill>
-                <a:effectLst/>
-                <a:uLnTx/>
-                <a:uFillTx/>
-                <a:latin typeface="Arial" pitchFamily="34" charset="0"/>
-                <a:ea typeface="HG明朝E" panose="02020909000000000000" pitchFamily="17" charset="-128"/>
-                <a:cs typeface="Arial" pitchFamily="34" charset="0"/>
-              </a:endParaRPr>
-            </a:p>
-          </p:txBody>
-        </p:sp>
-        <p:sp>
-          <p:nvSpPr>
-            <p:cNvPr id="185" name="角丸四角形 21"/>
-            <p:cNvSpPr/>
-            <p:nvPr/>
-          </p:nvSpPr>
-          <p:spPr bwMode="auto">
-            <a:xfrm>
-              <a:off x="2912999" y="4396227"/>
-              <a:ext cx="1668143" cy="253545"/>
-            </a:xfrm>
-            <a:prstGeom prst="roundRect">
-              <a:avLst/>
-            </a:prstGeom>
-            <a:solidFill>
-              <a:srgbClr val="7030A0"/>
-            </a:solidFill>
-            <a:ln w="25400" cap="flat" cmpd="sng" algn="ctr">
-              <a:solidFill>
-                <a:schemeClr val="accent4">
-                  <a:lumMod val="50000"/>
-                </a:schemeClr>
-              </a:solidFill>
-              <a:prstDash val="solid"/>
-              <a:round/>
-              <a:headEnd type="none" w="med" len="med"/>
-              <a:tailEnd type="none" w="med" len="med"/>
-            </a:ln>
-            <a:effectLst/>
-            <a:extLst/>
-          </p:spPr>
-          <p:txBody>
-            <a:bodyPr vert="horz" wrap="square" lIns="91440" tIns="45720" rIns="91440" bIns="45720" numCol="1" rtlCol="0" anchor="ctr" anchorCtr="0" compatLnSpc="1">
-              <a:prstTxWarp prst="textNoShape">
-                <a:avLst/>
-              </a:prstTxWarp>
-            </a:bodyPr>
-            <a:lstStyle/>
-            <a:p>
-              <a:pPr algn="ctr" fontAlgn="ctr"/>
-              <a:r>
-                <a:rPr lang="en-US" altLang="ja-JP" sz="600" dirty="0" smtClean="0">
-                  <a:solidFill>
-                    <a:schemeClr val="bg1"/>
-                  </a:solidFill>
-                  <a:latin typeface="Arial" pitchFamily="34" charset="0"/>
-                  <a:ea typeface="HG明朝E" panose="02020909000000000000" pitchFamily="17" charset="-128"/>
-                  <a:cs typeface="Arial" pitchFamily="34" charset="0"/>
-                </a:rPr>
-                <a:t>Runtime Environment</a:t>
-              </a:r>
-              <a:endParaRPr lang="ja-JP" altLang="en-US" sz="600" dirty="0" smtClean="0">
-                <a:solidFill>
-                  <a:schemeClr val="bg1"/>
-                </a:solidFill>
-                <a:latin typeface="Arial" pitchFamily="34" charset="0"/>
-                <a:ea typeface="HG明朝E" panose="02020909000000000000" pitchFamily="17" charset="-128"/>
-                <a:cs typeface="Arial" pitchFamily="34" charset="0"/>
-              </a:endParaRPr>
-            </a:p>
-          </p:txBody>
-        </p:sp>
-        <p:cxnSp>
-          <p:nvCxnSpPr>
-            <p:cNvPr id="186" name="直線矢印コネクタ 72"/>
-            <p:cNvCxnSpPr/>
-            <p:nvPr/>
-          </p:nvCxnSpPr>
-          <p:spPr bwMode="auto">
-            <a:xfrm>
-              <a:off x="4182163" y="4209096"/>
-              <a:ext cx="0" cy="217391"/>
-            </a:xfrm>
-            <a:prstGeom prst="straightConnector1">
-              <a:avLst/>
-            </a:prstGeom>
-            <a:noFill/>
-            <a:ln w="19050" cap="flat" cmpd="sng" algn="ctr">
-              <a:solidFill>
-                <a:sysClr val="windowText" lastClr="000000"/>
-              </a:solidFill>
-              <a:prstDash val="solid"/>
-              <a:headEnd type="triangle" w="med" len="sm"/>
-              <a:tailEnd type="triangle" w="med" len="sm"/>
-            </a:ln>
-            <a:effectLst>
-              <a:outerShdw blurRad="38100" dist="25400" dir="5400000" rotWithShape="0">
-                <a:srgbClr val="000000">
-                  <a:alpha val="40000"/>
-                </a:srgbClr>
-              </a:outerShdw>
-            </a:effectLst>
-            <a:extLst/>
-          </p:spPr>
-        </p:cxnSp>
-        <p:cxnSp>
-          <p:nvCxnSpPr>
-            <p:cNvPr id="187" name="直線矢印コネクタ 75"/>
-            <p:cNvCxnSpPr/>
-            <p:nvPr/>
-          </p:nvCxnSpPr>
-          <p:spPr bwMode="auto">
-            <a:xfrm>
-              <a:off x="3318068" y="4209096"/>
-              <a:ext cx="0" cy="217391"/>
-            </a:xfrm>
-            <a:prstGeom prst="straightConnector1">
-              <a:avLst/>
-            </a:prstGeom>
-            <a:noFill/>
-            <a:ln w="19050" cap="flat" cmpd="sng" algn="ctr">
-              <a:solidFill>
-                <a:sysClr val="windowText" lastClr="000000"/>
-              </a:solidFill>
-              <a:prstDash val="solid"/>
-              <a:headEnd type="triangle" w="med" len="sm"/>
-              <a:tailEnd type="triangle" w="med" len="sm"/>
-            </a:ln>
-            <a:effectLst>
-              <a:outerShdw blurRad="38100" dist="25400" dir="5400000" rotWithShape="0">
-                <a:srgbClr val="000000">
-                  <a:alpha val="40000"/>
-                </a:srgbClr>
-              </a:outerShdw>
-            </a:effectLst>
-            <a:extLst/>
-          </p:spPr>
-        </p:cxnSp>
-      </p:grpSp>
       <p:pic>
         <p:nvPicPr>
           <p:cNvPr id="104" name="図 164"/>
@@ -6367,7 +6008,7 @@
           <a:blip r:embed="rId6" cstate="print">
             <a:extLst>
               <a:ext uri="{28A0092B-C50C-407E-A947-70E740481C1C}">
-                <a14:useLocalDpi xmlns:a14="http://schemas.microsoft.com/office/drawing/2010/main" xmlns="" val="0"/>
+                <a14:useLocalDpi xmlns="" xmlns:a14="http://schemas.microsoft.com/office/drawing/2010/main" val="0"/>
               </a:ext>
             </a:extLst>
           </a:blip>
@@ -6489,8 +6130,8 @@
         </p:nvSpPr>
         <p:spPr>
           <a:xfrm>
-            <a:off x="3131840" y="4934818"/>
-            <a:ext cx="1684565" cy="923330"/>
+            <a:off x="3303170" y="4934818"/>
+            <a:ext cx="1513235" cy="861774"/>
           </a:xfrm>
           <a:prstGeom prst="rect">
             <a:avLst/>
@@ -6505,40 +6146,40 @@
           <a:p>
             <a:pPr algn="r"/>
             <a:r>
-              <a:rPr lang="de-DE" dirty="0" err="1" smtClean="0"/>
+              <a:rPr lang="de-DE" sz="1600" dirty="0" err="1" smtClean="0"/>
               <a:t>Complementing</a:t>
             </a:r>
-            <a:endParaRPr lang="de-DE" dirty="0" smtClean="0"/>
+            <a:endParaRPr lang="de-DE" sz="1600" dirty="0" smtClean="0"/>
           </a:p>
           <a:p>
             <a:pPr algn="r"/>
             <a:r>
-              <a:rPr lang="de-DE" dirty="0" err="1" smtClean="0"/>
+              <a:rPr lang="de-DE" sz="1600" dirty="0" err="1" smtClean="0"/>
               <a:t>Existing</a:t>
             </a:r>
             <a:r>
-              <a:rPr lang="de-DE" dirty="0" smtClean="0"/>
+              <a:rPr lang="de-DE" sz="1600" dirty="0" smtClean="0"/>
               <a:t> Devices</a:t>
             </a:r>
           </a:p>
           <a:p>
             <a:pPr algn="r"/>
             <a:r>
-              <a:rPr lang="de-DE" dirty="0" smtClean="0"/>
+              <a:rPr lang="de-DE" sz="1600" dirty="0" smtClean="0"/>
               <a:t>and </a:t>
             </a:r>
             <a:r>
-              <a:rPr lang="de-DE" dirty="0" err="1" smtClean="0"/>
+              <a:rPr lang="de-DE" sz="1600" dirty="0" err="1" smtClean="0"/>
               <a:t>Platforms</a:t>
             </a:r>
-            <a:endParaRPr lang="de-DE" dirty="0"/>
+            <a:endParaRPr lang="de-DE" sz="1600" dirty="0"/>
           </a:p>
         </p:txBody>
       </p:sp>
     </p:spTree>
     <p:extLst>
       <p:ext uri="{BB962C8B-B14F-4D97-AF65-F5344CB8AC3E}">
-        <p14:creationId xmlns:p14="http://schemas.microsoft.com/office/powerpoint/2010/main" xmlns="" val="2751291277"/>
+        <p14:creationId xmlns="" xmlns:p14="http://schemas.microsoft.com/office/powerpoint/2010/main" val="2751291277"/>
       </p:ext>
     </p:extLst>
   </p:cSld>

</xml_diff>